<commit_message>
Versao Atualizada - Apresentacao
</commit_message>
<xml_diff>
--- a/35 - Academici Banca.pptx
+++ b/35 - Academici Banca.pptx
@@ -11,21 +11,22 @@
     <p:sldId id="275" r:id="rId5"/>
     <p:sldId id="265" r:id="rId6"/>
     <p:sldId id="259" r:id="rId7"/>
-    <p:sldId id="260" r:id="rId8"/>
-    <p:sldId id="261" r:id="rId9"/>
-    <p:sldId id="262" r:id="rId10"/>
-    <p:sldId id="263" r:id="rId11"/>
-    <p:sldId id="264" r:id="rId12"/>
-    <p:sldId id="266" r:id="rId13"/>
-    <p:sldId id="267" r:id="rId14"/>
-    <p:sldId id="268" r:id="rId15"/>
-    <p:sldId id="274" r:id="rId16"/>
-    <p:sldId id="270" r:id="rId17"/>
-    <p:sldId id="276" r:id="rId18"/>
-    <p:sldId id="271" r:id="rId19"/>
-    <p:sldId id="272" r:id="rId20"/>
-    <p:sldId id="273" r:id="rId21"/>
-    <p:sldId id="269" r:id="rId22"/>
+    <p:sldId id="277" r:id="rId8"/>
+    <p:sldId id="260" r:id="rId9"/>
+    <p:sldId id="261" r:id="rId10"/>
+    <p:sldId id="262" r:id="rId11"/>
+    <p:sldId id="263" r:id="rId12"/>
+    <p:sldId id="264" r:id="rId13"/>
+    <p:sldId id="266" r:id="rId14"/>
+    <p:sldId id="267" r:id="rId15"/>
+    <p:sldId id="268" r:id="rId16"/>
+    <p:sldId id="274" r:id="rId17"/>
+    <p:sldId id="270" r:id="rId18"/>
+    <p:sldId id="276" r:id="rId19"/>
+    <p:sldId id="271" r:id="rId20"/>
+    <p:sldId id="272" r:id="rId21"/>
+    <p:sldId id="273" r:id="rId22"/>
+    <p:sldId id="269" r:id="rId23"/>
   </p:sldIdLst>
   <p:sldSz cx="10080625" cy="7559675"/>
   <p:notesSz cx="7559675" cy="10691813"/>
@@ -2204,13 +2205,13 @@
   <p:clrMapOvr>
     <a:masterClrMapping/>
   </p:clrMapOvr>
-  <mc:AlternateContent xmlns:mc="http://schemas.openxmlformats.org/markup-compatibility/2006">
-    <mc:Choice xmlns:p14="http://schemas.microsoft.com/office/powerpoint/2010/main" Requires="p14">
+  <mc:AlternateContent xmlns:mc="http://schemas.openxmlformats.org/markup-compatibility/2006" xmlns:p14="http://schemas.microsoft.com/office/powerpoint/2010/main">
+    <mc:Choice Requires="p14">
       <p:transition spd="med" p14:dur="700">
         <p:fade/>
       </p:transition>
     </mc:Choice>
-    <mc:Fallback>
+    <mc:Fallback xmlns="">
       <p:transition spd="med">
         <p:fade/>
       </p:transition>
@@ -2245,7 +2246,7 @@
       </p:grpSpPr>
       <p:sp>
         <p:nvSpPr>
-          <p:cNvPr id="69" name="TextShape 1"/>
+          <p:cNvPr id="67" name="TextShape 1"/>
           <p:cNvSpPr txBox="1"/>
           <p:nvPr/>
         </p:nvSpPr>
@@ -2282,7 +2283,7 @@
           <a:p>
             <a:r>
               <a:rPr lang="pt-BR" dirty="0" err="1"/>
-              <a:t>Product</a:t>
+              <a:t>Elevator</a:t>
             </a:r>
             <a:r>
               <a:rPr lang="pt-BR" dirty="0"/>
@@ -2290,49 +2291,103 @@
             </a:r>
             <a:r>
               <a:rPr lang="pt-BR" dirty="0" err="1"/>
-              <a:t>Backlog</a:t>
+              <a:t>Statement</a:t>
             </a:r>
             <a:endParaRPr lang="pt-BR" dirty="0"/>
           </a:p>
         </p:txBody>
       </p:sp>
-      <p:pic>
-        <p:nvPicPr>
-          <p:cNvPr id="70" name="Imagem 69"/>
-          <p:cNvPicPr/>
+      <p:sp>
+        <p:nvSpPr>
+          <p:cNvPr id="68" name="TextShape 2"/>
+          <p:cNvSpPr txBox="1"/>
           <p:nvPr/>
-        </p:nvPicPr>
-        <p:blipFill>
-          <a:blip r:embed="rId2"/>
-          <a:stretch>
-            <a:fillRect/>
-          </a:stretch>
-        </p:blipFill>
-        <p:spPr>
-          <a:xfrm>
-            <a:off x="144000" y="1944000"/>
-            <a:ext cx="9868680" cy="4661280"/>
-          </a:xfrm>
-          <a:prstGeom prst="rect">
-            <a:avLst/>
-          </a:prstGeom>
+        </p:nvSpPr>
+        <p:spPr>
+          <a:xfrm>
+            <a:off x="504000" y="1769039"/>
+            <a:ext cx="9071640" cy="5323165"/>
+          </a:xfrm>
+          <a:prstGeom prst="rect">
+            <a:avLst/>
+          </a:prstGeom>
+          <a:noFill/>
           <a:ln>
             <a:noFill/>
           </a:ln>
         </p:spPr>
-      </p:pic>
+        <p:txBody>
+          <a:bodyPr lIns="0" tIns="0" rIns="0" bIns="0"/>
+          <a:lstStyle/>
+          <a:p>
+            <a:pPr algn="just">
+              <a:lnSpc>
+                <a:spcPct val="114000"/>
+              </a:lnSpc>
+              <a:spcAft>
+                <a:spcPts val="600"/>
+              </a:spcAft>
+            </a:pPr>
+            <a:r>
+              <a:rPr lang="pt-BR" sz="2400" b="0" i="1" strike="noStrike" spc="-1" dirty="0">
+                <a:solidFill>
+                  <a:srgbClr val="FFFFFF"/>
+                </a:solidFill>
+                <a:uFill>
+                  <a:solidFill>
+                    <a:srgbClr val="FFFFFF"/>
+                  </a:solidFill>
+                </a:uFill>
+                <a:latin typeface="Agency FB" pitchFamily="34" charset="0"/>
+                <a:ea typeface="Microsoft YaHei"/>
+              </a:rPr>
+              <a:t>Para &lt;&lt;alunos, monitores e professores universitários&gt;&gt; Que &lt;&lt;necessitam de uma plataforma de integração para as monitorias&gt;&gt; O &lt;&lt;</a:t>
+            </a:r>
+            <a:r>
+              <a:rPr lang="pt-BR" sz="2400" b="0" i="1" strike="noStrike" spc="-1" dirty="0" err="1">
+                <a:solidFill>
+                  <a:srgbClr val="FFFFFF"/>
+                </a:solidFill>
+                <a:uFill>
+                  <a:solidFill>
+                    <a:srgbClr val="FFFFFF"/>
+                  </a:solidFill>
+                </a:uFill>
+                <a:latin typeface="Agency FB" pitchFamily="34" charset="0"/>
+                <a:ea typeface="Microsoft YaHei"/>
+              </a:rPr>
+              <a:t>Academicci</a:t>
+            </a:r>
+            <a:r>
+              <a:rPr lang="pt-BR" sz="2400" b="0" i="1" strike="noStrike" spc="-1" dirty="0">
+                <a:solidFill>
+                  <a:srgbClr val="FFFFFF"/>
+                </a:solidFill>
+                <a:uFill>
+                  <a:solidFill>
+                    <a:srgbClr val="FFFFFF"/>
+                  </a:solidFill>
+                </a:uFill>
+                <a:latin typeface="Agency FB" pitchFamily="34" charset="0"/>
+                <a:ea typeface="Microsoft YaHei"/>
+              </a:rPr>
+              <a:t>&gt;&gt;é um &lt;&lt;aplicação baseada em web&gt;&gt; Que &lt;&lt;integra os aspectos da monitoria em um ambiente virtual, possibilitando comunicação, controle e divulgação de conteúdo criando fácil acesso entre alunos e mentores&gt;&gt; Diferentemente do &lt;&lt; controle de chamadas e conteúdos em planilhas e papéis, comunicação informal e distanciamento do docente&gt;&gt; Nosso produto &lt;&lt;busca facilitar a interação entre monitores, professores e alunos; oferecendo gestão do processo de monitoria, possibilitar o compartilhamento de conhecimento de forma real e efetiva e disponibiliza uma plataforma de estudos sanando os problemas gerados atualmente. Automatização dos processos e emissão dos certificados&gt;&gt;</a:t>
+            </a:r>
+          </a:p>
+        </p:txBody>
+      </p:sp>
     </p:spTree>
   </p:cSld>
   <p:clrMapOvr>
     <a:masterClrMapping/>
   </p:clrMapOvr>
-  <mc:AlternateContent xmlns:mc="http://schemas.openxmlformats.org/markup-compatibility/2006">
-    <mc:Choice xmlns:p14="http://schemas.microsoft.com/office/powerpoint/2010/main" Requires="p14">
+  <mc:AlternateContent xmlns:mc="http://schemas.openxmlformats.org/markup-compatibility/2006" xmlns:p14="http://schemas.microsoft.com/office/powerpoint/2010/main">
+    <mc:Choice Requires="p14">
       <p:transition spd="med" p14:dur="700">
         <p:fade/>
       </p:transition>
     </mc:Choice>
-    <mc:Fallback>
+    <mc:Fallback xmlns="">
       <p:transition spd="med">
         <p:fade/>
       </p:transition>
@@ -2367,7 +2422,7 @@
       </p:grpSpPr>
       <p:sp>
         <p:nvSpPr>
-          <p:cNvPr id="71" name="TextShape 1"/>
+          <p:cNvPr id="69" name="TextShape 1"/>
           <p:cNvSpPr txBox="1"/>
           <p:nvPr/>
         </p:nvSpPr>
@@ -2420,7 +2475,7 @@
       </p:sp>
       <p:pic>
         <p:nvPicPr>
-          <p:cNvPr id="72" name="Imagem 71"/>
+          <p:cNvPr id="70" name="Imagem 69"/>
           <p:cNvPicPr/>
           <p:nvPr/>
         </p:nvPicPr>
@@ -2432,8 +2487,8 @@
         </p:blipFill>
         <p:spPr>
           <a:xfrm>
-            <a:off x="216000" y="2426760"/>
-            <a:ext cx="9748080" cy="4701240"/>
+            <a:off x="144000" y="1944000"/>
+            <a:ext cx="9868680" cy="4661280"/>
           </a:xfrm>
           <a:prstGeom prst="rect">
             <a:avLst/>
@@ -2443,90 +2498,18 @@
           </a:ln>
         </p:spPr>
       </p:pic>
-      <p:sp>
-        <p:nvSpPr>
-          <p:cNvPr id="73" name="TextShape 2"/>
-          <p:cNvSpPr txBox="1"/>
-          <p:nvPr/>
-        </p:nvSpPr>
-        <p:spPr>
-          <a:xfrm>
-            <a:off x="288000" y="1512000"/>
-            <a:ext cx="9504000" cy="715320"/>
-          </a:xfrm>
-          <a:prstGeom prst="rect">
-            <a:avLst/>
-          </a:prstGeom>
-          <a:noFill/>
-          <a:ln>
-            <a:noFill/>
-          </a:ln>
-        </p:spPr>
-        <p:txBody>
-          <a:bodyPr lIns="90000" tIns="45000" rIns="90000" bIns="45000"/>
-          <a:lstStyle/>
-          <a:p>
-            <a:pPr marL="215900" indent="-215900">
-              <a:buClr>
-                <a:srgbClr val="000000"/>
-              </a:buClr>
-              <a:buSzPct val="45000"/>
-              <a:buFont typeface="Wingdings" charset="2"/>
-              <a:buChar char=""/>
-            </a:pPr>
-            <a:r>
-              <a:rPr lang="pt-BR" sz="2200" b="0" strike="noStrike" spc="-1">
-                <a:solidFill>
-                  <a:schemeClr val="bg1"/>
-                </a:solidFill>
-                <a:uFill>
-                  <a:solidFill>
-                    <a:srgbClr val="FFFFFF"/>
-                  </a:solidFill>
-                </a:uFill>
-                <a:latin typeface="Arial"/>
-              </a:rPr>
-              <a:t>Target Process</a:t>
-            </a:r>
-          </a:p>
-          <a:p>
-            <a:pPr marL="215900" indent="-215900">
-              <a:buClr>
-                <a:srgbClr val="000000"/>
-              </a:buClr>
-              <a:buSzPct val="45000"/>
-              <a:buFont typeface="Wingdings" charset="2"/>
-              <a:buChar char=""/>
-            </a:pPr>
-            <a:r>
-              <a:rPr lang="pt-BR" sz="2200" b="0" strike="noStrike" spc="-1">
-                <a:solidFill>
-                  <a:schemeClr val="bg1"/>
-                </a:solidFill>
-                <a:uFill>
-                  <a:solidFill>
-                    <a:srgbClr val="FFFFFF"/>
-                  </a:solidFill>
-                </a:uFill>
-                <a:latin typeface="Arial"/>
-              </a:rPr>
-              <a:t>Kanban</a:t>
-            </a:r>
-          </a:p>
-        </p:txBody>
-      </p:sp>
     </p:spTree>
   </p:cSld>
   <p:clrMapOvr>
     <a:masterClrMapping/>
   </p:clrMapOvr>
-  <mc:AlternateContent xmlns:mc="http://schemas.openxmlformats.org/markup-compatibility/2006">
-    <mc:Choice xmlns:p14="http://schemas.microsoft.com/office/powerpoint/2010/main" Requires="p14">
+  <mc:AlternateContent xmlns:mc="http://schemas.openxmlformats.org/markup-compatibility/2006" xmlns:p14="http://schemas.microsoft.com/office/powerpoint/2010/main">
+    <mc:Choice Requires="p14">
       <p:transition spd="med" p14:dur="700">
         <p:fade/>
       </p:transition>
     </mc:Choice>
-    <mc:Fallback>
+    <mc:Fallback xmlns="">
       <p:transition spd="med">
         <p:fade/>
       </p:transition>
@@ -2561,7 +2544,7 @@
       </p:grpSpPr>
       <p:sp>
         <p:nvSpPr>
-          <p:cNvPr id="77" name="TextShape 1"/>
+          <p:cNvPr id="71" name="TextShape 1"/>
           <p:cNvSpPr txBox="1"/>
           <p:nvPr/>
         </p:nvSpPr>
@@ -2597,23 +2580,56 @@
           </a:lstStyle>
           <a:p>
             <a:r>
-              <a:rPr lang="pt-BR" dirty="0" smtClean="0"/>
-              <a:t>Planejamento da Sprint</a:t>
+              <a:rPr lang="pt-BR" dirty="0" err="1"/>
+              <a:t>Product</a:t>
+            </a:r>
+            <a:r>
+              <a:rPr lang="pt-BR" dirty="0"/>
+              <a:t> </a:t>
+            </a:r>
+            <a:r>
+              <a:rPr lang="pt-BR" dirty="0" err="1"/>
+              <a:t>Backlog</a:t>
             </a:r>
             <a:endParaRPr lang="pt-BR" dirty="0"/>
           </a:p>
         </p:txBody>
       </p:sp>
-      <p:sp>
-        <p:nvSpPr>
-          <p:cNvPr id="78" name="TextShape 2"/>
+      <p:pic>
+        <p:nvPicPr>
+          <p:cNvPr id="72" name="Imagem 71"/>
+          <p:cNvPicPr/>
+          <p:nvPr/>
+        </p:nvPicPr>
+        <p:blipFill>
+          <a:blip r:embed="rId2"/>
+          <a:stretch>
+            <a:fillRect/>
+          </a:stretch>
+        </p:blipFill>
+        <p:spPr>
+          <a:xfrm>
+            <a:off x="216000" y="2426760"/>
+            <a:ext cx="9748080" cy="4701240"/>
+          </a:xfrm>
+          <a:prstGeom prst="rect">
+            <a:avLst/>
+          </a:prstGeom>
+          <a:ln>
+            <a:noFill/>
+          </a:ln>
+        </p:spPr>
+      </p:pic>
+      <p:sp>
+        <p:nvSpPr>
+          <p:cNvPr id="73" name="TextShape 2"/>
           <p:cNvSpPr txBox="1"/>
           <p:nvPr/>
         </p:nvSpPr>
         <p:spPr>
           <a:xfrm>
-            <a:off x="504000" y="1769040"/>
-            <a:ext cx="9071640" cy="4384440"/>
+            <a:off x="288000" y="1512000"/>
+            <a:ext cx="9504000" cy="715320"/>
           </a:xfrm>
           <a:prstGeom prst="rect">
             <a:avLst/>
@@ -2624,32 +2640,46 @@
           </a:ln>
         </p:spPr>
         <p:txBody>
-          <a:bodyPr lIns="0" tIns="0" rIns="0" bIns="0"/>
+          <a:bodyPr lIns="90000" tIns="45000" rIns="90000" bIns="45000"/>
           <a:lstStyle/>
           <a:p>
-            <a:pPr marL="450850" indent="-342900">
+            <a:pPr marL="342900" indent="-342900">
               <a:buClr>
-                <a:srgbClr val="FFFFFF"/>
+                <a:schemeClr val="bg1"/>
               </a:buClr>
               <a:buSzPct val="100000"/>
-              <a:buFont typeface="Arial" charset="0"/>
+              <a:buFont typeface="Arial" pitchFamily="34" charset="0"/>
               <a:buChar char="•"/>
             </a:pPr>
             <a:r>
-              <a:rPr lang="pt-BR" sz="3200" b="0" strike="noStrike" spc="-1" dirty="0" smtClean="0">
-                <a:solidFill>
-                  <a:schemeClr val="bg1"/>
-                </a:solidFill>
-                <a:uFill>
-                  <a:solidFill>
-                    <a:srgbClr val="FFFFFF"/>
-                  </a:solidFill>
-                </a:uFill>
-                <a:latin typeface="Arial Rounded MT Bold" pitchFamily="34" charset="0"/>
-              </a:rPr>
-              <a:t>Funcionalidades:</a:t>
-            </a:r>
-            <a:endParaRPr lang="pt-BR" sz="3200" b="0" strike="noStrike" spc="-1" dirty="0" smtClean="0">
+              <a:rPr lang="pt-BR" sz="2400" b="0" strike="noStrike" spc="-1" dirty="0">
+                <a:solidFill>
+                  <a:schemeClr val="bg1"/>
+                </a:solidFill>
+                <a:uFill>
+                  <a:solidFill>
+                    <a:srgbClr val="FFFFFF"/>
+                  </a:solidFill>
+                </a:uFill>
+                <a:latin typeface="Agency FB" pitchFamily="34" charset="0"/>
+              </a:rPr>
+              <a:t>Target </a:t>
+            </a:r>
+            <a:r>
+              <a:rPr lang="pt-BR" sz="2400" b="0" strike="noStrike" spc="-1" dirty="0" err="1">
+                <a:solidFill>
+                  <a:schemeClr val="bg1"/>
+                </a:solidFill>
+                <a:uFill>
+                  <a:solidFill>
+                    <a:srgbClr val="FFFFFF"/>
+                  </a:solidFill>
+                </a:uFill>
+                <a:latin typeface="Agency FB" pitchFamily="34" charset="0"/>
+              </a:rPr>
+              <a:t>Process</a:t>
+            </a:r>
+            <a:endParaRPr lang="pt-BR" sz="2400" b="0" strike="noStrike" spc="-1" dirty="0">
               <a:solidFill>
                 <a:schemeClr val="bg1"/>
               </a:solidFill>
@@ -2658,21 +2688,20 @@
                   <a:srgbClr val="FFFFFF"/>
                 </a:solidFill>
               </a:uFill>
-              <a:latin typeface="Arial Rounded MT Bold" pitchFamily="34" charset="0"/>
-              <a:ea typeface="Microsoft YaHei"/>
+              <a:latin typeface="Agency FB" pitchFamily="34" charset="0"/>
             </a:endParaRPr>
           </a:p>
           <a:p>
-            <a:pPr marL="908050" lvl="1" indent="-342900">
+            <a:pPr marL="342900" indent="-342900">
               <a:buClr>
-                <a:srgbClr val="FFFFFF"/>
+                <a:schemeClr val="bg1"/>
               </a:buClr>
               <a:buSzPct val="100000"/>
-              <a:buFont typeface="Arial" charset="0"/>
+              <a:buFont typeface="Arial" pitchFamily="34" charset="0"/>
               <a:buChar char="•"/>
             </a:pPr>
             <a:r>
-              <a:rPr lang="pt-BR" sz="4000" b="0" strike="noStrike" spc="-1" dirty="0" smtClean="0">
+              <a:rPr lang="pt-BR" sz="2400" b="0" strike="noStrike" spc="-1" dirty="0" err="1">
                 <a:solidFill>
                   <a:schemeClr val="bg1"/>
                 </a:solidFill>
@@ -2682,90 +2711,20 @@
                   </a:solidFill>
                 </a:uFill>
                 <a:latin typeface="Agency FB" pitchFamily="34" charset="0"/>
-                <a:ea typeface="Microsoft YaHei"/>
-              </a:rPr>
-              <a:t>Realizar </a:t>
-            </a:r>
-            <a:r>
-              <a:rPr lang="pt-BR" sz="4000" b="0" strike="noStrike" spc="-1" dirty="0" err="1">
-                <a:solidFill>
-                  <a:schemeClr val="bg1"/>
-                </a:solidFill>
-                <a:uFill>
-                  <a:solidFill>
-                    <a:srgbClr val="FFFFFF"/>
-                  </a:solidFill>
-                </a:uFill>
-                <a:latin typeface="Agency FB" pitchFamily="34" charset="0"/>
-                <a:ea typeface="Microsoft YaHei"/>
-              </a:rPr>
-              <a:t>Login</a:t>
-            </a:r>
-            <a:r>
-              <a:rPr lang="pt-BR" sz="4000" b="0" strike="noStrike" spc="-1" dirty="0">
-                <a:solidFill>
-                  <a:schemeClr val="bg1"/>
-                </a:solidFill>
-                <a:uFill>
-                  <a:solidFill>
-                    <a:srgbClr val="FFFFFF"/>
-                  </a:solidFill>
-                </a:uFill>
-                <a:latin typeface="Agency FB" pitchFamily="34" charset="0"/>
-                <a:ea typeface="Microsoft YaHei"/>
-              </a:rPr>
-              <a:t>;</a:t>
-            </a:r>
-          </a:p>
-          <a:p>
-            <a:pPr marL="908050" lvl="1" indent="-342900">
-              <a:buClr>
-                <a:srgbClr val="FFFFFF"/>
-              </a:buClr>
-              <a:buSzPct val="100000"/>
-              <a:buFont typeface="Arial" charset="0"/>
-              <a:buChar char="•"/>
-            </a:pPr>
-            <a:r>
-              <a:rPr lang="pt-BR" sz="4000" b="0" strike="noStrike" spc="-1" dirty="0">
-                <a:solidFill>
-                  <a:schemeClr val="bg1"/>
-                </a:solidFill>
-                <a:uFill>
-                  <a:solidFill>
-                    <a:srgbClr val="FFFFFF"/>
-                  </a:solidFill>
-                </a:uFill>
-                <a:latin typeface="Agency FB" pitchFamily="34" charset="0"/>
-                <a:ea typeface="Microsoft YaHei"/>
-              </a:rPr>
-              <a:t>Cadastrar Aluno;</a:t>
-            </a:r>
-          </a:p>
-          <a:p>
-            <a:pPr marL="908050" lvl="1" indent="-342900">
-              <a:buClr>
-                <a:srgbClr val="FFFFFF"/>
-              </a:buClr>
-              <a:buSzPct val="100000"/>
-              <a:buFont typeface="Arial" charset="0"/>
-              <a:buChar char="•"/>
-            </a:pPr>
-            <a:r>
-              <a:rPr lang="pt-BR" sz="4000" b="0" strike="noStrike" spc="-1" dirty="0">
-                <a:solidFill>
-                  <a:schemeClr val="bg1"/>
-                </a:solidFill>
-                <a:uFill>
-                  <a:solidFill>
-                    <a:srgbClr val="FFFFFF"/>
-                  </a:solidFill>
-                </a:uFill>
-                <a:latin typeface="Agency FB" pitchFamily="34" charset="0"/>
-                <a:ea typeface="Microsoft YaHei"/>
-              </a:rPr>
-              <a:t>Candidatar a Monitor.</a:t>
-            </a:r>
+              </a:rPr>
+              <a:t>Kanban</a:t>
+            </a:r>
+            <a:endParaRPr lang="pt-BR" sz="2400" b="0" strike="noStrike" spc="-1" dirty="0">
+              <a:solidFill>
+                <a:schemeClr val="bg1"/>
+              </a:solidFill>
+              <a:uFill>
+                <a:solidFill>
+                  <a:srgbClr val="FFFFFF"/>
+                </a:solidFill>
+              </a:uFill>
+              <a:latin typeface="Agency FB" pitchFamily="34" charset="0"/>
+            </a:endParaRPr>
           </a:p>
         </p:txBody>
       </p:sp>
@@ -2774,13 +2733,13 @@
   <p:clrMapOvr>
     <a:masterClrMapping/>
   </p:clrMapOvr>
-  <mc:AlternateContent xmlns:mc="http://schemas.openxmlformats.org/markup-compatibility/2006">
-    <mc:Choice xmlns:p14="http://schemas.microsoft.com/office/powerpoint/2010/main" Requires="p14">
+  <mc:AlternateContent xmlns:mc="http://schemas.openxmlformats.org/markup-compatibility/2006" xmlns:p14="http://schemas.microsoft.com/office/powerpoint/2010/main">
+    <mc:Choice Requires="p14">
       <p:transition spd="med" p14:dur="700">
         <p:fade/>
       </p:transition>
     </mc:Choice>
-    <mc:Fallback>
+    <mc:Fallback xmlns="">
       <p:transition spd="med">
         <p:fade/>
       </p:transition>
@@ -2815,7 +2774,7 @@
       </p:grpSpPr>
       <p:sp>
         <p:nvSpPr>
-          <p:cNvPr id="79" name="TextShape 1"/>
+          <p:cNvPr id="77" name="TextShape 1"/>
           <p:cNvSpPr txBox="1"/>
           <p:nvPr/>
         </p:nvSpPr>
@@ -2851,74 +2810,190 @@
           </a:lstStyle>
           <a:p>
             <a:r>
-              <a:rPr lang="pt-BR" dirty="0"/>
-              <a:t>Desenvolvimento</a:t>
-            </a:r>
-          </a:p>
-        </p:txBody>
-      </p:sp>
-      <p:pic>
-        <p:nvPicPr>
-          <p:cNvPr id="80" name="Imagem 79"/>
-          <p:cNvPicPr/>
+              <a:rPr lang="pt-BR" dirty="0" smtClean="0"/>
+              <a:t>Planejamento da Sprint</a:t>
+            </a:r>
+            <a:endParaRPr lang="pt-BR" dirty="0"/>
+          </a:p>
+        </p:txBody>
+      </p:sp>
+      <p:sp>
+        <p:nvSpPr>
+          <p:cNvPr id="78" name="TextShape 2"/>
+          <p:cNvSpPr txBox="1"/>
           <p:nvPr/>
-        </p:nvPicPr>
-        <p:blipFill>
-          <a:blip r:embed="rId2"/>
-          <a:stretch>
-            <a:fillRect/>
-          </a:stretch>
-        </p:blipFill>
-        <p:spPr>
-          <a:xfrm>
-            <a:off x="641520" y="2952000"/>
-            <a:ext cx="3534480" cy="2446560"/>
-          </a:xfrm>
-          <a:prstGeom prst="rect">
-            <a:avLst/>
-          </a:prstGeom>
+        </p:nvSpPr>
+        <p:spPr>
+          <a:xfrm>
+            <a:off x="504000" y="1769040"/>
+            <a:ext cx="9071640" cy="4384440"/>
+          </a:xfrm>
+          <a:prstGeom prst="rect">
+            <a:avLst/>
+          </a:prstGeom>
+          <a:noFill/>
           <a:ln>
             <a:noFill/>
           </a:ln>
         </p:spPr>
-      </p:pic>
-      <p:pic>
-        <p:nvPicPr>
-          <p:cNvPr id="81" name="Imagem 80"/>
-          <p:cNvPicPr/>
-          <p:nvPr/>
-        </p:nvPicPr>
-        <p:blipFill>
-          <a:blip r:embed="rId3"/>
-          <a:stretch>
-            <a:fillRect/>
-          </a:stretch>
-        </p:blipFill>
-        <p:spPr>
-          <a:xfrm>
-            <a:off x="6408000" y="3111840"/>
-            <a:ext cx="2545920" cy="2360160"/>
-          </a:xfrm>
-          <a:prstGeom prst="rect">
-            <a:avLst/>
-          </a:prstGeom>
-          <a:ln>
-            <a:noFill/>
-          </a:ln>
-        </p:spPr>
-      </p:pic>
+        <p:txBody>
+          <a:bodyPr lIns="0" tIns="0" rIns="0" bIns="0"/>
+          <a:lstStyle/>
+          <a:p>
+            <a:pPr marL="450850" indent="-342900">
+              <a:buClr>
+                <a:srgbClr val="FFFFFF"/>
+              </a:buClr>
+              <a:buSzPct val="100000"/>
+              <a:buFont typeface="Arial" charset="0"/>
+              <a:buChar char="•"/>
+            </a:pPr>
+            <a:r>
+              <a:rPr lang="pt-BR" sz="3200" b="0" strike="noStrike" spc="-1" dirty="0" smtClean="0">
+                <a:solidFill>
+                  <a:schemeClr val="bg1"/>
+                </a:solidFill>
+                <a:uFill>
+                  <a:solidFill>
+                    <a:srgbClr val="FFFFFF"/>
+                  </a:solidFill>
+                </a:uFill>
+                <a:latin typeface="Arial Rounded MT Bold" pitchFamily="34" charset="0"/>
+              </a:rPr>
+              <a:t>Funcionalidades:</a:t>
+            </a:r>
+            <a:endParaRPr lang="pt-BR" sz="3200" b="0" strike="noStrike" spc="-1" dirty="0" smtClean="0">
+              <a:solidFill>
+                <a:schemeClr val="bg1"/>
+              </a:solidFill>
+              <a:uFill>
+                <a:solidFill>
+                  <a:srgbClr val="FFFFFF"/>
+                </a:solidFill>
+              </a:uFill>
+              <a:latin typeface="Arial Rounded MT Bold" pitchFamily="34" charset="0"/>
+              <a:ea typeface="Microsoft YaHei"/>
+            </a:endParaRPr>
+          </a:p>
+          <a:p>
+            <a:pPr marL="908050" lvl="1" indent="-342900">
+              <a:buClr>
+                <a:srgbClr val="FFFFFF"/>
+              </a:buClr>
+              <a:buSzPct val="100000"/>
+              <a:buFont typeface="Arial" charset="0"/>
+              <a:buChar char="•"/>
+            </a:pPr>
+            <a:r>
+              <a:rPr lang="pt-BR" sz="4000" b="0" strike="noStrike" spc="-1" dirty="0" smtClean="0">
+                <a:solidFill>
+                  <a:schemeClr val="bg1"/>
+                </a:solidFill>
+                <a:uFill>
+                  <a:solidFill>
+                    <a:srgbClr val="FFFFFF"/>
+                  </a:solidFill>
+                </a:uFill>
+                <a:latin typeface="Agency FB" pitchFamily="34" charset="0"/>
+                <a:ea typeface="Microsoft YaHei"/>
+              </a:rPr>
+              <a:t>Realizar </a:t>
+            </a:r>
+            <a:r>
+              <a:rPr lang="pt-BR" sz="4000" b="0" strike="noStrike" spc="-1" dirty="0" err="1">
+                <a:solidFill>
+                  <a:schemeClr val="bg1"/>
+                </a:solidFill>
+                <a:uFill>
+                  <a:solidFill>
+                    <a:srgbClr val="FFFFFF"/>
+                  </a:solidFill>
+                </a:uFill>
+                <a:latin typeface="Agency FB" pitchFamily="34" charset="0"/>
+                <a:ea typeface="Microsoft YaHei"/>
+              </a:rPr>
+              <a:t>Login</a:t>
+            </a:r>
+            <a:r>
+              <a:rPr lang="pt-BR" sz="4000" b="0" strike="noStrike" spc="-1" dirty="0">
+                <a:solidFill>
+                  <a:schemeClr val="bg1"/>
+                </a:solidFill>
+                <a:uFill>
+                  <a:solidFill>
+                    <a:srgbClr val="FFFFFF"/>
+                  </a:solidFill>
+                </a:uFill>
+                <a:latin typeface="Agency FB" pitchFamily="34" charset="0"/>
+                <a:ea typeface="Microsoft YaHei"/>
+              </a:rPr>
+              <a:t>;</a:t>
+            </a:r>
+          </a:p>
+          <a:p>
+            <a:pPr marL="908050" lvl="1" indent="-342900">
+              <a:buClr>
+                <a:srgbClr val="FFFFFF"/>
+              </a:buClr>
+              <a:buSzPct val="100000"/>
+              <a:buFont typeface="Arial" charset="0"/>
+              <a:buChar char="•"/>
+            </a:pPr>
+            <a:r>
+              <a:rPr lang="pt-BR" sz="4000" b="0" strike="noStrike" spc="-1" dirty="0">
+                <a:solidFill>
+                  <a:schemeClr val="bg1"/>
+                </a:solidFill>
+                <a:uFill>
+                  <a:solidFill>
+                    <a:srgbClr val="FFFFFF"/>
+                  </a:solidFill>
+                </a:uFill>
+                <a:latin typeface="Agency FB" pitchFamily="34" charset="0"/>
+                <a:ea typeface="Microsoft YaHei"/>
+              </a:rPr>
+              <a:t>Cadastrar Aluno;</a:t>
+            </a:r>
+          </a:p>
+          <a:p>
+            <a:pPr marL="908050" lvl="1" indent="-342900">
+              <a:buClr>
+                <a:srgbClr val="FFFFFF"/>
+              </a:buClr>
+              <a:buSzPct val="100000"/>
+              <a:buFont typeface="Arial" charset="0"/>
+              <a:buChar char="•"/>
+            </a:pPr>
+            <a:r>
+              <a:rPr lang="pt-BR" sz="4000" b="0" strike="noStrike" spc="-1" dirty="0">
+                <a:solidFill>
+                  <a:schemeClr val="bg1"/>
+                </a:solidFill>
+                <a:uFill>
+                  <a:solidFill>
+                    <a:srgbClr val="FFFFFF"/>
+                  </a:solidFill>
+                </a:uFill>
+                <a:latin typeface="Agency FB" pitchFamily="34" charset="0"/>
+                <a:ea typeface="Microsoft YaHei"/>
+              </a:rPr>
+              <a:t>Candidatar a Monitor.</a:t>
+            </a:r>
+          </a:p>
+        </p:txBody>
+      </p:sp>
     </p:spTree>
   </p:cSld>
   <p:clrMapOvr>
     <a:masterClrMapping/>
   </p:clrMapOvr>
-  <mc:AlternateContent xmlns:mc="http://schemas.openxmlformats.org/markup-compatibility/2006">
-    <mc:Choice xmlns:p14="http://schemas.microsoft.com/office/powerpoint/2010/main" Requires="p14">
+  <mc:AlternateContent xmlns:mc="http://schemas.openxmlformats.org/markup-compatibility/2006" xmlns:p14="http://schemas.microsoft.com/office/powerpoint/2010/main">
+    <mc:Choice Requires="p14">
       <p:transition spd="med" p14:dur="700">
         <p:fade/>
       </p:transition>
     </mc:Choice>
-    <mc:Fallback>
+    <mc:Fallback xmlns="">
       <p:transition spd="med">
         <p:fade/>
       </p:transition>
@@ -2953,7 +3028,7 @@
       </p:grpSpPr>
       <p:sp>
         <p:nvSpPr>
-          <p:cNvPr id="82" name="TextShape 1"/>
+          <p:cNvPr id="79" name="TextShape 1"/>
           <p:cNvSpPr txBox="1"/>
           <p:nvPr/>
         </p:nvSpPr>
@@ -2995,82 +3070,9 @@
           </a:p>
         </p:txBody>
       </p:sp>
-      <p:sp>
-        <p:nvSpPr>
-          <p:cNvPr id="83" name="TextShape 2"/>
-          <p:cNvSpPr txBox="1"/>
-          <p:nvPr/>
-        </p:nvSpPr>
-        <p:spPr>
-          <a:xfrm>
-            <a:off x="504000" y="1769040"/>
-            <a:ext cx="9071640" cy="4384440"/>
-          </a:xfrm>
-          <a:prstGeom prst="rect">
-            <a:avLst/>
-          </a:prstGeom>
-          <a:noFill/>
-          <a:ln>
-            <a:noFill/>
-          </a:ln>
-        </p:spPr>
-        <p:txBody>
-          <a:bodyPr lIns="0" tIns="0" rIns="0" bIns="0"/>
-          <a:lstStyle/>
-          <a:p>
-            <a:pPr marL="565150" indent="-457200">
-              <a:buClr>
-                <a:schemeClr val="bg1"/>
-              </a:buClr>
-              <a:buSzPct val="100000"/>
-              <a:buFont typeface="Arial" pitchFamily="34" charset="0"/>
-              <a:buChar char="•"/>
-            </a:pPr>
-            <a:r>
-              <a:rPr lang="pt-BR" sz="3200" b="0" strike="noStrike" spc="-1" dirty="0">
-                <a:solidFill>
-                  <a:schemeClr val="bg1"/>
-                </a:solidFill>
-                <a:uFill>
-                  <a:solidFill>
-                    <a:srgbClr val="FFFFFF"/>
-                  </a:solidFill>
-                </a:uFill>
-                <a:latin typeface="Agency FB" pitchFamily="34" charset="0"/>
-              </a:rPr>
-              <a:t>Gráfico </a:t>
-            </a:r>
-            <a:r>
-              <a:rPr lang="pt-BR" sz="3200" b="0" strike="noStrike" spc="-1" dirty="0" err="1">
-                <a:solidFill>
-                  <a:schemeClr val="bg1"/>
-                </a:solidFill>
-                <a:uFill>
-                  <a:solidFill>
-                    <a:srgbClr val="FFFFFF"/>
-                  </a:solidFill>
-                </a:uFill>
-                <a:latin typeface="Agency FB" pitchFamily="34" charset="0"/>
-              </a:rPr>
-              <a:t>BurnDown</a:t>
-            </a:r>
-            <a:endParaRPr lang="pt-BR" sz="3200" b="0" strike="noStrike" spc="-1" dirty="0">
-              <a:solidFill>
-                <a:schemeClr val="bg1"/>
-              </a:solidFill>
-              <a:uFill>
-                <a:solidFill>
-                  <a:srgbClr val="FFFFFF"/>
-                </a:solidFill>
-              </a:uFill>
-              <a:latin typeface="Agency FB" pitchFamily="34" charset="0"/>
-            </a:endParaRPr>
-          </a:p>
-        </p:txBody>
-      </p:sp>
       <p:pic>
         <p:nvPicPr>
-          <p:cNvPr id="84" name="Imagem 83"/>
+          <p:cNvPr id="80" name="Imagem 79"/>
           <p:cNvPicPr/>
           <p:nvPr/>
         </p:nvPicPr>
@@ -3082,8 +3084,33 @@
         </p:blipFill>
         <p:spPr>
           <a:xfrm>
-            <a:off x="144000" y="2664000"/>
-            <a:ext cx="9861840" cy="3922920"/>
+            <a:off x="641520" y="2952000"/>
+            <a:ext cx="3534480" cy="2446560"/>
+          </a:xfrm>
+          <a:prstGeom prst="rect">
+            <a:avLst/>
+          </a:prstGeom>
+          <a:ln>
+            <a:noFill/>
+          </a:ln>
+        </p:spPr>
+      </p:pic>
+      <p:pic>
+        <p:nvPicPr>
+          <p:cNvPr id="81" name="Imagem 80"/>
+          <p:cNvPicPr/>
+          <p:nvPr/>
+        </p:nvPicPr>
+        <p:blipFill>
+          <a:blip r:embed="rId3"/>
+          <a:stretch>
+            <a:fillRect/>
+          </a:stretch>
+        </p:blipFill>
+        <p:spPr>
+          <a:xfrm>
+            <a:off x="6408000" y="3111840"/>
+            <a:ext cx="2545920" cy="2360160"/>
           </a:xfrm>
           <a:prstGeom prst="rect">
             <a:avLst/>
@@ -3098,13 +3125,13 @@
   <p:clrMapOvr>
     <a:masterClrMapping/>
   </p:clrMapOvr>
-  <mc:AlternateContent xmlns:mc="http://schemas.openxmlformats.org/markup-compatibility/2006">
-    <mc:Choice xmlns:p14="http://schemas.microsoft.com/office/powerpoint/2010/main" Requires="p14">
+  <mc:AlternateContent xmlns:mc="http://schemas.openxmlformats.org/markup-compatibility/2006" xmlns:p14="http://schemas.microsoft.com/office/powerpoint/2010/main">
+    <mc:Choice Requires="p14">
       <p:transition spd="med" p14:dur="700">
         <p:fade/>
       </p:transition>
     </mc:Choice>
-    <mc:Fallback>
+    <mc:Fallback xmlns="">
       <p:transition spd="med">
         <p:fade/>
       </p:transition>
@@ -3175,10 +3202,9 @@
           </a:lstStyle>
           <a:p>
             <a:r>
-              <a:rPr lang="pt-BR" dirty="0" smtClean="0"/>
-              <a:t>Testes</a:t>
-            </a:r>
-            <a:endParaRPr lang="pt-BR" dirty="0"/>
+              <a:rPr lang="pt-BR" dirty="0"/>
+              <a:t>Desenvolvimento</a:t>
+            </a:r>
           </a:p>
         </p:txBody>
       </p:sp>
@@ -3214,42 +3240,32 @@
               <a:buChar char="•"/>
             </a:pPr>
             <a:r>
-              <a:rPr lang="pt-BR" sz="3200" b="0" strike="noStrike" spc="-1" dirty="0" smtClean="0">
-                <a:solidFill>
-                  <a:schemeClr val="bg1"/>
-                </a:solidFill>
-                <a:uFill>
-                  <a:solidFill>
-                    <a:srgbClr val="FFFFFF"/>
-                  </a:solidFill>
-                </a:uFill>
-                <a:latin typeface="Arial"/>
-              </a:rPr>
-              <a:t>Casos de Teste;</a:t>
-            </a:r>
-          </a:p>
-          <a:p>
-            <a:pPr marL="565150" indent="-457200">
-              <a:buClr>
-                <a:schemeClr val="bg1"/>
-              </a:buClr>
-              <a:buSzPct val="100000"/>
-              <a:buFont typeface="Arial" pitchFamily="34" charset="0"/>
-              <a:buChar char="•"/>
-            </a:pPr>
-            <a:r>
-              <a:rPr lang="pt-BR" sz="3200" spc="-1" dirty="0" smtClean="0">
-                <a:solidFill>
-                  <a:schemeClr val="bg1"/>
-                </a:solidFill>
-                <a:uFill>
-                  <a:solidFill>
-                    <a:srgbClr val="FFFFFF"/>
-                  </a:solidFill>
-                </a:uFill>
-                <a:latin typeface="Arial"/>
-              </a:rPr>
-              <a:t>Plano de Teste</a:t>
+              <a:rPr lang="pt-BR" sz="3200" b="0" strike="noStrike" spc="-1" dirty="0">
+                <a:solidFill>
+                  <a:schemeClr val="bg1"/>
+                </a:solidFill>
+                <a:uFill>
+                  <a:solidFill>
+                    <a:srgbClr val="FFFFFF"/>
+                  </a:solidFill>
+                </a:uFill>
+                <a:latin typeface="Agency FB" pitchFamily="34" charset="0"/>
+              </a:rPr>
+              <a:t>Gráfico </a:t>
+            </a:r>
+            <a:r>
+              <a:rPr lang="pt-BR" sz="3200" b="0" strike="noStrike" spc="-1" dirty="0" err="1">
+                <a:solidFill>
+                  <a:schemeClr val="bg1"/>
+                </a:solidFill>
+                <a:uFill>
+                  <a:solidFill>
+                    <a:srgbClr val="FFFFFF"/>
+                  </a:solidFill>
+                </a:uFill>
+                <a:latin typeface="Agency FB" pitchFamily="34" charset="0"/>
+              </a:rPr>
+              <a:t>BurnDown</a:t>
             </a:r>
             <a:endParaRPr lang="pt-BR" sz="3200" b="0" strike="noStrike" spc="-1" dirty="0">
               <a:solidFill>
@@ -3260,28 +3276,48 @@
                   <a:srgbClr val="FFFFFF"/>
                 </a:solidFill>
               </a:uFill>
-              <a:latin typeface="Arial"/>
+              <a:latin typeface="Agency FB" pitchFamily="34" charset="0"/>
             </a:endParaRPr>
           </a:p>
         </p:txBody>
       </p:sp>
+      <p:pic>
+        <p:nvPicPr>
+          <p:cNvPr id="84" name="Imagem 83"/>
+          <p:cNvPicPr/>
+          <p:nvPr/>
+        </p:nvPicPr>
+        <p:blipFill>
+          <a:blip r:embed="rId2"/>
+          <a:stretch>
+            <a:fillRect/>
+          </a:stretch>
+        </p:blipFill>
+        <p:spPr>
+          <a:xfrm>
+            <a:off x="144000" y="2664000"/>
+            <a:ext cx="9861840" cy="3922920"/>
+          </a:xfrm>
+          <a:prstGeom prst="rect">
+            <a:avLst/>
+          </a:prstGeom>
+          <a:ln>
+            <a:noFill/>
+          </a:ln>
+        </p:spPr>
+      </p:pic>
     </p:spTree>
-    <p:extLst>
-      <p:ext uri="{BB962C8B-B14F-4D97-AF65-F5344CB8AC3E}">
-        <p14:creationId xmlns:p14="http://schemas.microsoft.com/office/powerpoint/2010/main" val="1060820488"/>
-      </p:ext>
-    </p:extLst>
   </p:cSld>
   <p:clrMapOvr>
     <a:masterClrMapping/>
   </p:clrMapOvr>
-  <mc:AlternateContent xmlns:mc="http://schemas.openxmlformats.org/markup-compatibility/2006">
-    <mc:Choice xmlns:p14="http://schemas.microsoft.com/office/powerpoint/2010/main" Requires="p14">
+  <mc:AlternateContent xmlns:mc="http://schemas.openxmlformats.org/markup-compatibility/2006" xmlns:p14="http://schemas.microsoft.com/office/powerpoint/2010/main">
+    <mc:Choice Requires="p14">
       <p:transition spd="med" p14:dur="700">
         <p:fade/>
       </p:transition>
     </mc:Choice>
-    <mc:Fallback>
+    <mc:Fallback xmlns="">
       <p:transition spd="med">
         <p:fade/>
       </p:transition>
@@ -3322,7 +3358,7 @@
         </p:nvSpPr>
         <p:spPr>
           <a:xfrm>
-            <a:off x="504000" y="107429"/>
+            <a:off x="504000" y="301320"/>
             <a:ext cx="9071640" cy="1262160"/>
           </a:xfrm>
           <a:prstGeom prst="rect">
@@ -3352,8 +3388,8 @@
           </a:lstStyle>
           <a:p>
             <a:r>
-              <a:rPr lang="pt-BR" dirty="0"/>
-              <a:t>Artefatos</a:t>
+              <a:rPr lang="pt-BR" dirty="0" smtClean="0"/>
+              <a:t>Testes</a:t>
             </a:r>
             <a:endParaRPr lang="pt-BR" dirty="0"/>
           </a:p>
@@ -3361,164 +3397,139 @@
       </p:sp>
       <p:sp>
         <p:nvSpPr>
-          <p:cNvPr id="4" name="Subtítulo 3"/>
-          <p:cNvSpPr>
-            <a:spLocks noGrp="1"/>
-          </p:cNvSpPr>
-          <p:nvPr>
-            <p:ph type="subTitle"/>
-          </p:nvPr>
-        </p:nvSpPr>
-        <p:spPr/>
-        <p:txBody>
-          <a:bodyPr anchor="t"/>
+          <p:cNvPr id="83" name="TextShape 2"/>
+          <p:cNvSpPr txBox="1"/>
+          <p:nvPr/>
+        </p:nvSpPr>
+        <p:spPr>
+          <a:xfrm>
+            <a:off x="504000" y="1769040"/>
+            <a:ext cx="9071640" cy="4384440"/>
+          </a:xfrm>
+          <a:prstGeom prst="rect">
+            <a:avLst/>
+          </a:prstGeom>
+          <a:noFill/>
+          <a:ln>
+            <a:noFill/>
+          </a:ln>
+        </p:spPr>
+        <p:txBody>
+          <a:bodyPr lIns="0" tIns="0" rIns="0" bIns="0"/>
           <a:lstStyle/>
           <a:p>
-            <a:pPr marL="342900" indent="-342900">
+            <a:pPr marL="565150" indent="-457200">
               <a:buClr>
                 <a:schemeClr val="bg1"/>
               </a:buClr>
+              <a:buSzPct val="100000"/>
               <a:buFont typeface="Arial" pitchFamily="34" charset="0"/>
               <a:buChar char="•"/>
             </a:pPr>
             <a:r>
-              <a:rPr lang="pt-BR" sz="2800" dirty="0" smtClean="0">
-                <a:solidFill>
-                  <a:schemeClr val="bg1"/>
-                </a:solidFill>
+              <a:rPr lang="pt-BR" sz="3600" b="0" strike="noStrike" spc="-1" dirty="0" smtClean="0">
+                <a:solidFill>
+                  <a:schemeClr val="bg1"/>
+                </a:solidFill>
+                <a:uFill>
+                  <a:solidFill>
+                    <a:srgbClr val="FFFFFF"/>
+                  </a:solidFill>
+                </a:uFill>
                 <a:latin typeface="Agency FB" pitchFamily="34" charset="0"/>
               </a:rPr>
-              <a:t>Documentos de Regras de Negócios; </a:t>
-            </a:r>
-          </a:p>
-          <a:p>
-            <a:pPr marL="342900" indent="-342900">
+              <a:t>Plano de Testes;</a:t>
+            </a:r>
+            <a:endParaRPr lang="pt-BR" sz="3600" b="0" strike="noStrike" spc="-1" dirty="0" smtClean="0">
+              <a:solidFill>
+                <a:schemeClr val="bg1"/>
+              </a:solidFill>
+              <a:uFill>
+                <a:solidFill>
+                  <a:srgbClr val="FFFFFF"/>
+                </a:solidFill>
+              </a:uFill>
+              <a:latin typeface="Agency FB" pitchFamily="34" charset="0"/>
+            </a:endParaRPr>
+          </a:p>
+          <a:p>
+            <a:pPr marL="565150" indent="-457200">
               <a:buClr>
                 <a:schemeClr val="bg1"/>
               </a:buClr>
+              <a:buSzPct val="100000"/>
               <a:buFont typeface="Arial" pitchFamily="34" charset="0"/>
               <a:buChar char="•"/>
             </a:pPr>
             <a:r>
-              <a:rPr lang="pt-BR" sz="2800" dirty="0" smtClean="0">
-                <a:solidFill>
-                  <a:schemeClr val="bg1"/>
-                </a:solidFill>
+              <a:rPr lang="pt-BR" sz="3600" spc="-1" dirty="0" smtClean="0">
+                <a:solidFill>
+                  <a:schemeClr val="bg1"/>
+                </a:solidFill>
+                <a:uFill>
+                  <a:solidFill>
+                    <a:srgbClr val="FFFFFF"/>
+                  </a:solidFill>
+                </a:uFill>
                 <a:latin typeface="Agency FB" pitchFamily="34" charset="0"/>
               </a:rPr>
-              <a:t>Documento de Mensagens;</a:t>
-            </a:r>
-          </a:p>
-          <a:p>
-            <a:pPr marL="342900" indent="-342900">
+              <a:t>Casos de Teste: </a:t>
+            </a:r>
+          </a:p>
+          <a:p>
+            <a:pPr marL="1022350" lvl="1" indent="-457200">
               <a:buClr>
                 <a:schemeClr val="bg1"/>
               </a:buClr>
+              <a:buSzPct val="100000"/>
               <a:buFont typeface="Arial" pitchFamily="34" charset="0"/>
               <a:buChar char="•"/>
             </a:pPr>
             <a:r>
-              <a:rPr lang="pt-BR" sz="2800" dirty="0" smtClean="0">
-                <a:solidFill>
-                  <a:schemeClr val="bg1"/>
-                </a:solidFill>
+              <a:rPr lang="pt-BR" sz="3600" b="0" strike="noStrike" spc="-1" dirty="0" smtClean="0">
+                <a:solidFill>
+                  <a:schemeClr val="bg1"/>
+                </a:solidFill>
+                <a:uFill>
+                  <a:solidFill>
+                    <a:srgbClr val="FFFFFF"/>
+                  </a:solidFill>
+                </a:uFill>
                 <a:latin typeface="Agency FB" pitchFamily="34" charset="0"/>
               </a:rPr>
-              <a:t>Listas de Riscos; </a:t>
-            </a:r>
-          </a:p>
-          <a:p>
-            <a:pPr marL="342900" indent="-342900">
-              <a:buClr>
-                <a:schemeClr val="bg1"/>
-              </a:buClr>
-              <a:buFont typeface="Arial" pitchFamily="34" charset="0"/>
-              <a:buChar char="•"/>
-            </a:pPr>
-            <a:r>
-              <a:rPr lang="pt-BR" sz="2800" dirty="0" smtClean="0">
-                <a:solidFill>
-                  <a:schemeClr val="bg1"/>
-                </a:solidFill>
-                <a:latin typeface="Agency FB" pitchFamily="34" charset="0"/>
-              </a:rPr>
-              <a:t>Documento de Interfaces;</a:t>
-            </a:r>
-          </a:p>
-          <a:p>
-            <a:pPr marL="342900" indent="-342900">
-              <a:buClr>
-                <a:schemeClr val="bg1"/>
-              </a:buClr>
-              <a:buFont typeface="Arial" pitchFamily="34" charset="0"/>
-              <a:buChar char="•"/>
-            </a:pPr>
-            <a:r>
-              <a:rPr lang="pt-BR" sz="2800" dirty="0" err="1" smtClean="0">
-                <a:solidFill>
-                  <a:schemeClr val="bg1"/>
-                </a:solidFill>
-                <a:latin typeface="Agency FB" pitchFamily="34" charset="0"/>
-              </a:rPr>
-              <a:t>Checklist</a:t>
-            </a:r>
-            <a:r>
-              <a:rPr lang="pt-BR" sz="2800" dirty="0" smtClean="0">
-                <a:solidFill>
-                  <a:schemeClr val="bg1"/>
-                </a:solidFill>
-                <a:latin typeface="Agency FB" pitchFamily="34" charset="0"/>
-              </a:rPr>
-              <a:t> </a:t>
-            </a:r>
-            <a:r>
-              <a:rPr lang="pt-BR" sz="2800" dirty="0" err="1" smtClean="0">
-                <a:solidFill>
-                  <a:schemeClr val="bg1"/>
-                </a:solidFill>
-                <a:latin typeface="Agency FB" pitchFamily="34" charset="0"/>
-              </a:rPr>
-              <a:t>Scrum</a:t>
-            </a:r>
-            <a:r>
-              <a:rPr lang="pt-BR" sz="2800" dirty="0" smtClean="0">
-                <a:solidFill>
-                  <a:schemeClr val="bg1"/>
-                </a:solidFill>
-                <a:latin typeface="Agency FB" pitchFamily="34" charset="0"/>
-              </a:rPr>
-              <a:t>;</a:t>
-            </a:r>
-          </a:p>
-          <a:p>
-            <a:pPr marL="342900" indent="-342900">
-              <a:buClr>
-                <a:schemeClr val="bg1"/>
-              </a:buClr>
-              <a:buFont typeface="Arial" pitchFamily="34" charset="0"/>
-              <a:buChar char="•"/>
-            </a:pPr>
-            <a:endParaRPr lang="pt-BR" sz="2800" dirty="0" smtClean="0">
+              <a:t>Unidade</a:t>
+            </a:r>
+            <a:endParaRPr lang="pt-BR" sz="3600" b="0" strike="noStrike" spc="-1" dirty="0">
               <a:solidFill>
                 <a:schemeClr val="bg1"/>
               </a:solidFill>
+              <a:uFill>
+                <a:solidFill>
+                  <a:srgbClr val="FFFFFF"/>
+                </a:solidFill>
+              </a:uFill>
               <a:latin typeface="Agency FB" pitchFamily="34" charset="0"/>
             </a:endParaRPr>
           </a:p>
         </p:txBody>
       </p:sp>
     </p:spTree>
+    <p:extLst>
+      <p:ext uri="{BB962C8B-B14F-4D97-AF65-F5344CB8AC3E}">
+        <p14:creationId xmlns:p14="http://schemas.microsoft.com/office/powerpoint/2010/main" val="1060820488"/>
+      </p:ext>
+    </p:extLst>
   </p:cSld>
   <p:clrMapOvr>
     <a:masterClrMapping/>
   </p:clrMapOvr>
-  <mc:AlternateContent xmlns:mc="http://schemas.openxmlformats.org/markup-compatibility/2006">
-    <mc:Choice xmlns:p14="http://schemas.microsoft.com/office/powerpoint/2010/main" Requires="p14">
+  <mc:AlternateContent xmlns:mc="http://schemas.openxmlformats.org/markup-compatibility/2006" xmlns:p14="http://schemas.microsoft.com/office/powerpoint/2010/main">
+    <mc:Choice Requires="p14">
       <p:transition spd="med" p14:dur="700">
         <p:fade/>
       </p:transition>
     </mc:Choice>
-    <mc:Fallback>
+    <mc:Fallback xmlns="">
       <p:transition spd="med">
         <p:fade/>
       </p:transition>
@@ -3592,57 +3603,174 @@
               <a:rPr lang="pt-BR" dirty="0"/>
               <a:t>Artefatos</a:t>
             </a:r>
-            <a:endParaRPr lang="pt-BR" dirty="0"/>
-          </a:p>
-        </p:txBody>
-      </p:sp>
-      <p:pic>
-        <p:nvPicPr>
-          <p:cNvPr id="2" name="Imagem 1"/>
-          <p:cNvPicPr>
-            <a:picLocks noChangeAspect="1"/>
-          </p:cNvPicPr>
-          <p:nvPr/>
-        </p:nvPicPr>
-        <p:blipFill>
-          <a:blip r:embed="rId2">
-            <a:extLst>
-              <a:ext uri="{28A0092B-C50C-407E-A947-70E740481C1C}">
-                <a14:useLocalDpi xmlns:a14="http://schemas.microsoft.com/office/drawing/2010/main" val="0"/>
-              </a:ext>
-            </a:extLst>
-          </a:blip>
-          <a:stretch>
-            <a:fillRect/>
-          </a:stretch>
-        </p:blipFill>
-        <p:spPr>
-          <a:xfrm>
-            <a:off x="2543776" y="1403573"/>
-            <a:ext cx="4993072" cy="5655868"/>
-          </a:xfrm>
-          <a:prstGeom prst="rect">
-            <a:avLst/>
-          </a:prstGeom>
-        </p:spPr>
-      </p:pic>
+          </a:p>
+        </p:txBody>
+      </p:sp>
+      <p:sp>
+        <p:nvSpPr>
+          <p:cNvPr id="4" name="Subtítulo 3"/>
+          <p:cNvSpPr>
+            <a:spLocks noGrp="1"/>
+          </p:cNvSpPr>
+          <p:nvPr>
+            <p:ph type="subTitle"/>
+          </p:nvPr>
+        </p:nvSpPr>
+        <p:spPr>
+          <a:xfrm>
+            <a:off x="504000" y="1581573"/>
+            <a:ext cx="9071640" cy="2918344"/>
+          </a:xfrm>
+        </p:spPr>
+        <p:txBody>
+          <a:bodyPr anchor="t"/>
+          <a:lstStyle/>
+          <a:p>
+            <a:pPr marL="342900" indent="-342900">
+              <a:buClr>
+                <a:schemeClr val="bg1"/>
+              </a:buClr>
+              <a:buFont typeface="Arial" pitchFamily="34" charset="0"/>
+              <a:buChar char="•"/>
+            </a:pPr>
+            <a:r>
+              <a:rPr lang="pt-BR" sz="2800" dirty="0" smtClean="0">
+                <a:solidFill>
+                  <a:schemeClr val="bg1"/>
+                </a:solidFill>
+                <a:latin typeface="Agency FB" pitchFamily="34" charset="0"/>
+              </a:rPr>
+              <a:t>Documentos de Regras de Negócios; </a:t>
+            </a:r>
+          </a:p>
+          <a:p>
+            <a:pPr marL="342900" indent="-342900">
+              <a:buClr>
+                <a:schemeClr val="bg1"/>
+              </a:buClr>
+              <a:buFont typeface="Arial" pitchFamily="34" charset="0"/>
+              <a:buChar char="•"/>
+            </a:pPr>
+            <a:r>
+              <a:rPr lang="pt-BR" sz="2800" dirty="0" smtClean="0">
+                <a:solidFill>
+                  <a:schemeClr val="bg1"/>
+                </a:solidFill>
+                <a:latin typeface="Agency FB" pitchFamily="34" charset="0"/>
+              </a:rPr>
+              <a:t>Documento de Mensagens;</a:t>
+            </a:r>
+          </a:p>
+          <a:p>
+            <a:pPr marL="342900" indent="-342900">
+              <a:buClr>
+                <a:schemeClr val="bg1"/>
+              </a:buClr>
+              <a:buFont typeface="Arial" pitchFamily="34" charset="0"/>
+              <a:buChar char="•"/>
+            </a:pPr>
+            <a:r>
+              <a:rPr lang="pt-BR" sz="2800" dirty="0" smtClean="0">
+                <a:solidFill>
+                  <a:schemeClr val="bg1"/>
+                </a:solidFill>
+                <a:latin typeface="Agency FB" pitchFamily="34" charset="0"/>
+              </a:rPr>
+              <a:t>Listas de Riscos; </a:t>
+            </a:r>
+          </a:p>
+          <a:p>
+            <a:pPr marL="342900" indent="-342900">
+              <a:buClr>
+                <a:schemeClr val="bg1"/>
+              </a:buClr>
+              <a:buFont typeface="Arial" pitchFamily="34" charset="0"/>
+              <a:buChar char="•"/>
+            </a:pPr>
+            <a:r>
+              <a:rPr lang="pt-BR" sz="2800" dirty="0" smtClean="0">
+                <a:solidFill>
+                  <a:schemeClr val="bg1"/>
+                </a:solidFill>
+                <a:latin typeface="Agency FB" pitchFamily="34" charset="0"/>
+              </a:rPr>
+              <a:t>Documento de Interfaces;</a:t>
+            </a:r>
+          </a:p>
+          <a:p>
+            <a:pPr marL="342900" indent="-342900">
+              <a:buClr>
+                <a:schemeClr val="bg1"/>
+              </a:buClr>
+              <a:buFont typeface="Arial" pitchFamily="34" charset="0"/>
+              <a:buChar char="•"/>
+            </a:pPr>
+            <a:r>
+              <a:rPr lang="pt-BR" sz="2800" dirty="0" err="1" smtClean="0">
+                <a:solidFill>
+                  <a:schemeClr val="bg1"/>
+                </a:solidFill>
+                <a:latin typeface="Agency FB" pitchFamily="34" charset="0"/>
+              </a:rPr>
+              <a:t>Checklist</a:t>
+            </a:r>
+            <a:r>
+              <a:rPr lang="pt-BR" sz="2800" dirty="0" smtClean="0">
+                <a:solidFill>
+                  <a:schemeClr val="bg1"/>
+                </a:solidFill>
+                <a:latin typeface="Agency FB" pitchFamily="34" charset="0"/>
+              </a:rPr>
+              <a:t> </a:t>
+            </a:r>
+            <a:r>
+              <a:rPr lang="pt-BR" sz="2800" dirty="0" err="1" smtClean="0">
+                <a:solidFill>
+                  <a:schemeClr val="bg1"/>
+                </a:solidFill>
+                <a:latin typeface="Agency FB" pitchFamily="34" charset="0"/>
+              </a:rPr>
+              <a:t>Scrum</a:t>
+            </a:r>
+            <a:r>
+              <a:rPr lang="pt-BR" sz="2800" dirty="0" smtClean="0">
+                <a:solidFill>
+                  <a:schemeClr val="bg1"/>
+                </a:solidFill>
+                <a:latin typeface="Agency FB" pitchFamily="34" charset="0"/>
+              </a:rPr>
+              <a:t>;</a:t>
+            </a:r>
+          </a:p>
+          <a:p>
+            <a:pPr marL="342900" indent="-342900">
+              <a:buClr>
+                <a:schemeClr val="bg1"/>
+              </a:buClr>
+              <a:buFont typeface="Arial" pitchFamily="34" charset="0"/>
+              <a:buChar char="•"/>
+            </a:pPr>
+            <a:endParaRPr lang="pt-BR" sz="2800" dirty="0" smtClean="0">
+              <a:solidFill>
+                <a:schemeClr val="bg1"/>
+              </a:solidFill>
+              <a:latin typeface="Agency FB" pitchFamily="34" charset="0"/>
+            </a:endParaRPr>
+          </a:p>
+        </p:txBody>
+      </p:sp>
     </p:spTree>
-    <p:extLst>
-      <p:ext uri="{BB962C8B-B14F-4D97-AF65-F5344CB8AC3E}">
-        <p14:creationId xmlns:p14="http://schemas.microsoft.com/office/powerpoint/2010/main" val="2756156740"/>
-      </p:ext>
-    </p:extLst>
   </p:cSld>
   <p:clrMapOvr>
     <a:masterClrMapping/>
   </p:clrMapOvr>
-  <mc:AlternateContent xmlns:mc="http://schemas.openxmlformats.org/markup-compatibility/2006">
-    <mc:Choice xmlns:p14="http://schemas.microsoft.com/office/powerpoint/2010/main" Requires="p14">
+  <mc:AlternateContent xmlns:mc="http://schemas.openxmlformats.org/markup-compatibility/2006" xmlns:p14="http://schemas.microsoft.com/office/powerpoint/2010/main">
+    <mc:Choice Requires="p14">
       <p:transition spd="med" p14:dur="700">
         <p:fade/>
       </p:transition>
     </mc:Choice>
-    <mc:Fallback>
+    <mc:Fallback xmlns="">
       <p:transition spd="med">
         <p:fade/>
       </p:transition>
@@ -3716,7 +3844,6 @@
               <a:rPr lang="pt-BR" dirty="0"/>
               <a:t>Artefatos</a:t>
             </a:r>
-            <a:endParaRPr lang="pt-BR" dirty="0"/>
           </a:p>
         </p:txBody>
       </p:sp>
@@ -3742,8 +3869,8 @@
         </p:blipFill>
         <p:spPr>
           <a:xfrm>
-            <a:off x="2249287" y="1475582"/>
-            <a:ext cx="5582051" cy="4985786"/>
+            <a:off x="2543776" y="1403573"/>
+            <a:ext cx="4993072" cy="5655868"/>
           </a:xfrm>
           <a:prstGeom prst="rect">
             <a:avLst/>
@@ -3753,20 +3880,20 @@
     </p:spTree>
     <p:extLst>
       <p:ext uri="{BB962C8B-B14F-4D97-AF65-F5344CB8AC3E}">
-        <p14:creationId xmlns:p14="http://schemas.microsoft.com/office/powerpoint/2010/main" val="479910455"/>
+        <p14:creationId xmlns:p14="http://schemas.microsoft.com/office/powerpoint/2010/main" val="2756156740"/>
       </p:ext>
     </p:extLst>
   </p:cSld>
   <p:clrMapOvr>
     <a:masterClrMapping/>
   </p:clrMapOvr>
-  <mc:AlternateContent xmlns:mc="http://schemas.openxmlformats.org/markup-compatibility/2006">
-    <mc:Choice xmlns:p14="http://schemas.microsoft.com/office/powerpoint/2010/main" Requires="p14">
+  <mc:AlternateContent xmlns:mc="http://schemas.openxmlformats.org/markup-compatibility/2006" xmlns:p14="http://schemas.microsoft.com/office/powerpoint/2010/main">
+    <mc:Choice Requires="p14">
       <p:transition spd="med" p14:dur="700">
         <p:fade/>
       </p:transition>
     </mc:Choice>
-    <mc:Fallback>
+    <mc:Fallback xmlns="">
       <p:transition spd="med">
         <p:fade/>
       </p:transition>
@@ -3840,7 +3967,6 @@
               <a:rPr lang="pt-BR" dirty="0"/>
               <a:t>Artefatos</a:t>
             </a:r>
-            <a:endParaRPr lang="pt-BR" dirty="0"/>
           </a:p>
         </p:txBody>
       </p:sp>
@@ -3852,21 +3978,22 @@
           </p:cNvPicPr>
           <p:nvPr/>
         </p:nvPicPr>
-        <p:blipFill rotWithShape="1">
-          <a:blip r:embed="rId2" cstate="print">
+        <p:blipFill>
+          <a:blip r:embed="rId2">
             <a:extLst>
               <a:ext uri="{28A0092B-C50C-407E-A947-70E740481C1C}">
                 <a14:useLocalDpi xmlns:a14="http://schemas.microsoft.com/office/drawing/2010/main" val="0"/>
               </a:ext>
             </a:extLst>
           </a:blip>
-          <a:srcRect r="26463" b="36180"/>
-          <a:stretch/>
+          <a:stretch>
+            <a:fillRect/>
+          </a:stretch>
         </p:blipFill>
         <p:spPr>
           <a:xfrm>
-            <a:off x="1428062" y="1319192"/>
-            <a:ext cx="7224500" cy="4980925"/>
+            <a:off x="2249287" y="1475582"/>
+            <a:ext cx="5582051" cy="4985786"/>
           </a:xfrm>
           <a:prstGeom prst="rect">
             <a:avLst/>
@@ -3876,20 +4003,20 @@
     </p:spTree>
     <p:extLst>
       <p:ext uri="{BB962C8B-B14F-4D97-AF65-F5344CB8AC3E}">
-        <p14:creationId xmlns:p14="http://schemas.microsoft.com/office/powerpoint/2010/main" val="4287164654"/>
+        <p14:creationId xmlns:p14="http://schemas.microsoft.com/office/powerpoint/2010/main" val="479910455"/>
       </p:ext>
     </p:extLst>
   </p:cSld>
   <p:clrMapOvr>
     <a:masterClrMapping/>
   </p:clrMapOvr>
-  <mc:AlternateContent xmlns:mc="http://schemas.openxmlformats.org/markup-compatibility/2006">
-    <mc:Choice xmlns:p14="http://schemas.microsoft.com/office/powerpoint/2010/main" Requires="p14">
+  <mc:AlternateContent xmlns:mc="http://schemas.openxmlformats.org/markup-compatibility/2006" xmlns:p14="http://schemas.microsoft.com/office/powerpoint/2010/main">
+    <mc:Choice Requires="p14">
       <p:transition spd="med" p14:dur="700">
         <p:fade/>
       </p:transition>
     </mc:Choice>
-    <mc:Fallback>
+    <mc:Fallback xmlns="">
       <p:transition spd="med">
         <p:fade/>
       </p:transition>
@@ -4284,13 +4411,13 @@
   <p:clrMapOvr>
     <a:masterClrMapping/>
   </p:clrMapOvr>
-  <mc:AlternateContent xmlns:mc="http://schemas.openxmlformats.org/markup-compatibility/2006">
-    <mc:Choice xmlns:p14="http://schemas.microsoft.com/office/powerpoint/2010/main" Requires="p14">
+  <mc:AlternateContent xmlns:mc="http://schemas.openxmlformats.org/markup-compatibility/2006" xmlns:p14="http://schemas.microsoft.com/office/powerpoint/2010/main">
+    <mc:Choice Requires="p14">
       <p:transition spd="med" p14:dur="700">
         <p:fade/>
       </p:transition>
     </mc:Choice>
-    <mc:Fallback>
+    <mc:Fallback xmlns="">
       <p:transition spd="med">
         <p:fade/>
       </p:transition>
@@ -4364,33 +4491,32 @@
               <a:rPr lang="pt-BR" dirty="0"/>
               <a:t>Artefatos</a:t>
             </a:r>
-            <a:endParaRPr lang="pt-BR" dirty="0"/>
           </a:p>
         </p:txBody>
       </p:sp>
       <p:pic>
         <p:nvPicPr>
-          <p:cNvPr id="3" name="Imagem 2"/>
+          <p:cNvPr id="2" name="Imagem 1"/>
           <p:cNvPicPr>
             <a:picLocks noChangeAspect="1"/>
           </p:cNvPicPr>
           <p:nvPr/>
         </p:nvPicPr>
         <p:blipFill rotWithShape="1">
-          <a:blip r:embed="rId2">
+          <a:blip r:embed="rId2" cstate="print">
             <a:extLst>
               <a:ext uri="{28A0092B-C50C-407E-A947-70E740481C1C}">
                 <a14:useLocalDpi xmlns:a14="http://schemas.microsoft.com/office/drawing/2010/main" val="0"/>
               </a:ext>
             </a:extLst>
           </a:blip>
-          <a:srcRect l="20635" t="36481"/>
+          <a:srcRect r="26463" b="36180"/>
           <a:stretch/>
         </p:blipFill>
         <p:spPr>
           <a:xfrm>
-            <a:off x="1102642" y="2267669"/>
-            <a:ext cx="7875341" cy="3379068"/>
+            <a:off x="1428062" y="1319192"/>
+            <a:ext cx="7224500" cy="4980925"/>
           </a:xfrm>
           <a:prstGeom prst="rect">
             <a:avLst/>
@@ -4400,20 +4526,20 @@
     </p:spTree>
     <p:extLst>
       <p:ext uri="{BB962C8B-B14F-4D97-AF65-F5344CB8AC3E}">
-        <p14:creationId xmlns:p14="http://schemas.microsoft.com/office/powerpoint/2010/main" val="3569984483"/>
+        <p14:creationId xmlns:p14="http://schemas.microsoft.com/office/powerpoint/2010/main" val="4287164654"/>
       </p:ext>
     </p:extLst>
   </p:cSld>
   <p:clrMapOvr>
     <a:masterClrMapping/>
   </p:clrMapOvr>
-  <mc:AlternateContent xmlns:mc="http://schemas.openxmlformats.org/markup-compatibility/2006">
-    <mc:Choice xmlns:p14="http://schemas.microsoft.com/office/powerpoint/2010/main" Requires="p14">
+  <mc:AlternateContent xmlns:mc="http://schemas.openxmlformats.org/markup-compatibility/2006" xmlns:p14="http://schemas.microsoft.com/office/powerpoint/2010/main">
+    <mc:Choice Requires="p14">
       <p:transition spd="med" p14:dur="700">
         <p:fade/>
       </p:transition>
     </mc:Choice>
-    <mc:Fallback>
+    <mc:Fallback xmlns="">
       <p:transition spd="med">
         <p:fade/>
       </p:transition>
@@ -4448,13 +4574,13 @@
       </p:grpSpPr>
       <p:sp>
         <p:nvSpPr>
-          <p:cNvPr id="85" name="TextShape 1"/>
+          <p:cNvPr id="82" name="TextShape 1"/>
           <p:cNvSpPr txBox="1"/>
           <p:nvPr/>
         </p:nvSpPr>
         <p:spPr>
           <a:xfrm>
-            <a:off x="504000" y="301320"/>
+            <a:off x="504000" y="107429"/>
             <a:ext cx="9071640" cy="1262160"/>
           </a:xfrm>
           <a:prstGeom prst="rect">
@@ -4485,6 +4611,128 @@
           <a:p>
             <a:r>
               <a:rPr lang="pt-BR" dirty="0"/>
+              <a:t>Artefatos</a:t>
+            </a:r>
+          </a:p>
+        </p:txBody>
+      </p:sp>
+      <p:pic>
+        <p:nvPicPr>
+          <p:cNvPr id="3" name="Imagem 2"/>
+          <p:cNvPicPr>
+            <a:picLocks noChangeAspect="1"/>
+          </p:cNvPicPr>
+          <p:nvPr/>
+        </p:nvPicPr>
+        <p:blipFill rotWithShape="1">
+          <a:blip r:embed="rId2">
+            <a:extLst>
+              <a:ext uri="{28A0092B-C50C-407E-A947-70E740481C1C}">
+                <a14:useLocalDpi xmlns:a14="http://schemas.microsoft.com/office/drawing/2010/main" val="0"/>
+              </a:ext>
+            </a:extLst>
+          </a:blip>
+          <a:srcRect l="20635" t="36481"/>
+          <a:stretch/>
+        </p:blipFill>
+        <p:spPr>
+          <a:xfrm>
+            <a:off x="1102642" y="2267669"/>
+            <a:ext cx="7875341" cy="3379068"/>
+          </a:xfrm>
+          <a:prstGeom prst="rect">
+            <a:avLst/>
+          </a:prstGeom>
+        </p:spPr>
+      </p:pic>
+    </p:spTree>
+    <p:extLst>
+      <p:ext uri="{BB962C8B-B14F-4D97-AF65-F5344CB8AC3E}">
+        <p14:creationId xmlns:p14="http://schemas.microsoft.com/office/powerpoint/2010/main" val="3569984483"/>
+      </p:ext>
+    </p:extLst>
+  </p:cSld>
+  <p:clrMapOvr>
+    <a:masterClrMapping/>
+  </p:clrMapOvr>
+  <mc:AlternateContent xmlns:mc="http://schemas.openxmlformats.org/markup-compatibility/2006" xmlns:p14="http://schemas.microsoft.com/office/powerpoint/2010/main">
+    <mc:Choice Requires="p14">
+      <p:transition spd="med" p14:dur="700">
+        <p:fade/>
+      </p:transition>
+    </mc:Choice>
+    <mc:Fallback xmlns="">
+      <p:transition spd="med">
+        <p:fade/>
+      </p:transition>
+    </mc:Fallback>
+  </mc:AlternateContent>
+  <p:timing>
+    <p:tnLst>
+      <p:par>
+        <p:cTn id="1" dur="indefinite" restart="never" nodeType="tmRoot"/>
+      </p:par>
+    </p:tnLst>
+  </p:timing>
+</p:sld>
+</file>
+
+<file path=ppt/slides/slide22.xml><?xml version="1.0" encoding="utf-8"?>
+<p:sld xmlns:a="http://schemas.openxmlformats.org/drawingml/2006/main" xmlns:r="http://schemas.openxmlformats.org/officeDocument/2006/relationships" xmlns:p="http://schemas.openxmlformats.org/presentationml/2006/main">
+  <p:cSld>
+    <p:spTree>
+      <p:nvGrpSpPr>
+        <p:cNvPr id="1" name=""/>
+        <p:cNvGrpSpPr/>
+        <p:nvPr/>
+      </p:nvGrpSpPr>
+      <p:grpSpPr>
+        <a:xfrm>
+          <a:off x="0" y="0"/>
+          <a:ext cx="0" cy="0"/>
+          <a:chOff x="0" y="0"/>
+          <a:chExt cx="0" cy="0"/>
+        </a:xfrm>
+      </p:grpSpPr>
+      <p:sp>
+        <p:nvSpPr>
+          <p:cNvPr id="85" name="TextShape 1"/>
+          <p:cNvSpPr txBox="1"/>
+          <p:nvPr/>
+        </p:nvSpPr>
+        <p:spPr>
+          <a:xfrm>
+            <a:off x="504000" y="301320"/>
+            <a:ext cx="9071640" cy="1262160"/>
+          </a:xfrm>
+          <a:prstGeom prst="rect">
+            <a:avLst/>
+          </a:prstGeom>
+          <a:noFill/>
+          <a:ln>
+            <a:noFill/>
+          </a:ln>
+        </p:spPr>
+        <p:txBody>
+          <a:bodyPr lIns="0" tIns="0" rIns="0" bIns="0" anchor="ctr"/>
+          <a:lstStyle>
+            <a:lvl1pPr algn="ctr">
+              <a:defRPr sz="4400" strike="noStrike" spc="-1">
+                <a:solidFill>
+                  <a:schemeClr val="bg1"/>
+                </a:solidFill>
+                <a:uFill>
+                  <a:solidFill>
+                    <a:srgbClr val="FFFFFF"/>
+                  </a:solidFill>
+                </a:uFill>
+                <a:latin typeface="Arial Rounded MT Bold" pitchFamily="34" charset="0"/>
+              </a:defRPr>
+            </a:lvl1pPr>
+          </a:lstStyle>
+          <a:p>
+            <a:r>
+              <a:rPr lang="pt-BR" dirty="0"/>
               <a:t>Retrospectiva</a:t>
             </a:r>
           </a:p>
@@ -4498,7 +4746,7 @@
         </p:nvSpPr>
         <p:spPr>
           <a:xfrm>
-            <a:off x="504000" y="1769039"/>
+            <a:off x="504000" y="1547589"/>
             <a:ext cx="9071640" cy="5467181"/>
           </a:xfrm>
           <a:prstGeom prst="rect">
@@ -4525,34 +4773,34 @@
               <a:buChar char=""/>
             </a:pPr>
             <a:r>
-              <a:rPr lang="pt-BR" sz="1600" b="1" strike="noStrike" spc="-1" dirty="0">
-                <a:solidFill>
-                  <a:schemeClr val="bg1"/>
-                </a:solidFill>
-                <a:uFill>
-                  <a:solidFill>
-                    <a:srgbClr val="FFFFFF"/>
-                  </a:solidFill>
-                </a:uFill>
-                <a:latin typeface="+mj-lt"/>
+              <a:rPr lang="pt-BR" sz="2000" b="1" strike="noStrike" spc="-1" dirty="0">
+                <a:solidFill>
+                  <a:schemeClr val="bg1"/>
+                </a:solidFill>
+                <a:uFill>
+                  <a:solidFill>
+                    <a:srgbClr val="FFFFFF"/>
+                  </a:solidFill>
+                </a:uFill>
+                <a:latin typeface="Agency FB" pitchFamily="34" charset="0"/>
               </a:rPr>
               <a:t>Lições </a:t>
             </a:r>
             <a:r>
-              <a:rPr lang="pt-BR" sz="1600" b="1" strike="noStrike" spc="-1" dirty="0" smtClean="0">
-                <a:solidFill>
-                  <a:schemeClr val="bg1"/>
-                </a:solidFill>
-                <a:uFill>
-                  <a:solidFill>
-                    <a:srgbClr val="FFFFFF"/>
-                  </a:solidFill>
-                </a:uFill>
-                <a:latin typeface="+mj-lt"/>
+              <a:rPr lang="pt-BR" sz="2000" b="1" strike="noStrike" spc="-1" dirty="0" smtClean="0">
+                <a:solidFill>
+                  <a:schemeClr val="bg1"/>
+                </a:solidFill>
+                <a:uFill>
+                  <a:solidFill>
+                    <a:srgbClr val="FFFFFF"/>
+                  </a:solidFill>
+                </a:uFill>
+                <a:latin typeface="Agency FB" pitchFamily="34" charset="0"/>
               </a:rPr>
               <a:t>Aprendidas</a:t>
             </a:r>
-            <a:endParaRPr lang="pt-BR" sz="1600" b="1" strike="noStrike" spc="-1" dirty="0">
+            <a:endParaRPr lang="pt-BR" sz="2000" b="1" strike="noStrike" spc="-1" dirty="0">
               <a:solidFill>
                 <a:schemeClr val="bg1"/>
               </a:solidFill>
@@ -4561,7 +4809,7 @@
                   <a:srgbClr val="FFFFFF"/>
                 </a:solidFill>
               </a:uFill>
-              <a:latin typeface="+mj-lt"/>
+              <a:latin typeface="Agency FB" pitchFamily="34" charset="0"/>
             </a:endParaRPr>
           </a:p>
           <a:p>
@@ -4577,44 +4825,44 @@
               <a:buChar char=""/>
             </a:pPr>
             <a:r>
-              <a:rPr lang="pt-BR" sz="1600" b="0" strike="noStrike" spc="-1" dirty="0">
-                <a:solidFill>
-                  <a:schemeClr val="bg1"/>
-                </a:solidFill>
-                <a:uFill>
-                  <a:solidFill>
-                    <a:srgbClr val="FFFFFF"/>
-                  </a:solidFill>
-                </a:uFill>
-                <a:latin typeface="+mj-lt"/>
+              <a:rPr lang="pt-BR" sz="2000" b="0" strike="noStrike" spc="-1" dirty="0">
+                <a:solidFill>
+                  <a:schemeClr val="bg1"/>
+                </a:solidFill>
+                <a:uFill>
+                  <a:solidFill>
+                    <a:srgbClr val="FFFFFF"/>
+                  </a:solidFill>
+                </a:uFill>
+                <a:latin typeface="Agency FB" pitchFamily="34" charset="0"/>
               </a:rPr>
               <a:t>A aplicação da metodologia ágil na fabricação de um software quando o prazo é curto e com várias pessoal envolvidas no projeto faz com que o tempo seja melhor aproveitado devido a organização das etapas através das </a:t>
             </a:r>
             <a:r>
-              <a:rPr lang="pt-BR" sz="1600" b="0" strike="noStrike" spc="-1" dirty="0" err="1">
-                <a:solidFill>
-                  <a:schemeClr val="bg1"/>
-                </a:solidFill>
-                <a:uFill>
-                  <a:solidFill>
-                    <a:srgbClr val="FFFFFF"/>
-                  </a:solidFill>
-                </a:uFill>
-                <a:latin typeface="+mj-lt"/>
+              <a:rPr lang="pt-BR" sz="2000" b="0" strike="noStrike" spc="-1" dirty="0" err="1">
+                <a:solidFill>
+                  <a:schemeClr val="bg1"/>
+                </a:solidFill>
+                <a:uFill>
+                  <a:solidFill>
+                    <a:srgbClr val="FFFFFF"/>
+                  </a:solidFill>
+                </a:uFill>
+                <a:latin typeface="Agency FB" pitchFamily="34" charset="0"/>
               </a:rPr>
               <a:t>sprints</a:t>
             </a:r>
             <a:r>
-              <a:rPr lang="pt-BR" sz="1600" b="0" strike="noStrike" spc="-1" dirty="0">
-                <a:solidFill>
-                  <a:schemeClr val="bg1"/>
-                </a:solidFill>
-                <a:uFill>
-                  <a:solidFill>
-                    <a:srgbClr val="FFFFFF"/>
-                  </a:solidFill>
-                </a:uFill>
-                <a:latin typeface="+mj-lt"/>
+              <a:rPr lang="pt-BR" sz="2000" b="0" strike="noStrike" spc="-1" dirty="0">
+                <a:solidFill>
+                  <a:schemeClr val="bg1"/>
+                </a:solidFill>
+                <a:uFill>
+                  <a:solidFill>
+                    <a:srgbClr val="FFFFFF"/>
+                  </a:solidFill>
+                </a:uFill>
+                <a:latin typeface="Agency FB" pitchFamily="34" charset="0"/>
               </a:rPr>
               <a:t>.</a:t>
             </a:r>
@@ -4632,16 +4880,16 @@
               <a:buChar char=""/>
             </a:pPr>
             <a:r>
-              <a:rPr lang="pt-BR" sz="1600" b="0" strike="noStrike" spc="-1" dirty="0">
-                <a:solidFill>
-                  <a:schemeClr val="bg1"/>
-                </a:solidFill>
-                <a:uFill>
-                  <a:solidFill>
-                    <a:srgbClr val="FFFFFF"/>
-                  </a:solidFill>
-                </a:uFill>
-                <a:latin typeface="+mj-lt"/>
+              <a:rPr lang="pt-BR" sz="2000" b="0" strike="noStrike" spc="-1" dirty="0">
+                <a:solidFill>
+                  <a:schemeClr val="bg1"/>
+                </a:solidFill>
+                <a:uFill>
+                  <a:solidFill>
+                    <a:srgbClr val="FFFFFF"/>
+                  </a:solidFill>
+                </a:uFill>
+                <a:latin typeface="Agency FB" pitchFamily="34" charset="0"/>
               </a:rPr>
               <a:t>Comprometimento da equipe e bom relacionamento sempre é essencial para desenvolvimento do projeto mesmo com a aplicação da metodologia ágil.</a:t>
             </a:r>
@@ -4659,72 +4907,72 @@
               <a:buChar char=""/>
             </a:pPr>
             <a:r>
-              <a:rPr lang="pt-BR" sz="1600" b="0" strike="noStrike" spc="-1" dirty="0">
-                <a:solidFill>
-                  <a:schemeClr val="bg1"/>
-                </a:solidFill>
-                <a:uFill>
-                  <a:solidFill>
-                    <a:srgbClr val="FFFFFF"/>
-                  </a:solidFill>
-                </a:uFill>
-                <a:latin typeface="+mj-lt"/>
+              <a:rPr lang="pt-BR" sz="2000" b="0" strike="noStrike" spc="-1" dirty="0">
+                <a:solidFill>
+                  <a:schemeClr val="bg1"/>
+                </a:solidFill>
+                <a:uFill>
+                  <a:solidFill>
+                    <a:srgbClr val="FFFFFF"/>
+                  </a:solidFill>
+                </a:uFill>
+                <a:latin typeface="Agency FB" pitchFamily="34" charset="0"/>
               </a:rPr>
               <a:t>O </a:t>
             </a:r>
             <a:r>
-              <a:rPr lang="pt-BR" sz="1600" b="0" strike="noStrike" spc="-1" dirty="0" err="1">
-                <a:solidFill>
-                  <a:schemeClr val="bg1"/>
-                </a:solidFill>
-                <a:uFill>
-                  <a:solidFill>
-                    <a:srgbClr val="FFFFFF"/>
-                  </a:solidFill>
-                </a:uFill>
-                <a:latin typeface="+mj-lt"/>
+              <a:rPr lang="pt-BR" sz="2000" b="0" strike="noStrike" spc="-1" dirty="0" err="1">
+                <a:solidFill>
+                  <a:schemeClr val="bg1"/>
+                </a:solidFill>
+                <a:uFill>
+                  <a:solidFill>
+                    <a:srgbClr val="FFFFFF"/>
+                  </a:solidFill>
+                </a:uFill>
+                <a:latin typeface="Agency FB" pitchFamily="34" charset="0"/>
               </a:rPr>
               <a:t>Scrum</a:t>
             </a:r>
             <a:r>
-              <a:rPr lang="pt-BR" sz="1600" b="0" strike="noStrike" spc="-1" dirty="0">
-                <a:solidFill>
-                  <a:schemeClr val="bg1"/>
-                </a:solidFill>
-                <a:uFill>
-                  <a:solidFill>
-                    <a:srgbClr val="FFFFFF"/>
-                  </a:solidFill>
-                </a:uFill>
-                <a:latin typeface="+mj-lt"/>
+              <a:rPr lang="pt-BR" sz="2000" b="0" strike="noStrike" spc="-1" dirty="0">
+                <a:solidFill>
+                  <a:schemeClr val="bg1"/>
+                </a:solidFill>
+                <a:uFill>
+                  <a:solidFill>
+                    <a:srgbClr val="FFFFFF"/>
+                  </a:solidFill>
+                </a:uFill>
+                <a:latin typeface="Agency FB" pitchFamily="34" charset="0"/>
               </a:rPr>
               <a:t> é uma metodologia que quando aplicada, gera um produto melhor, pois ao final de cada </a:t>
             </a:r>
             <a:r>
-              <a:rPr lang="pt-BR" sz="1600" b="0" strike="noStrike" spc="-1" dirty="0" err="1">
-                <a:solidFill>
-                  <a:schemeClr val="bg1"/>
-                </a:solidFill>
-                <a:uFill>
-                  <a:solidFill>
-                    <a:srgbClr val="FFFFFF"/>
-                  </a:solidFill>
-                </a:uFill>
-                <a:latin typeface="+mj-lt"/>
+              <a:rPr lang="pt-BR" sz="2000" b="0" strike="noStrike" spc="-1" dirty="0" err="1">
+                <a:solidFill>
+                  <a:schemeClr val="bg1"/>
+                </a:solidFill>
+                <a:uFill>
+                  <a:solidFill>
+                    <a:srgbClr val="FFFFFF"/>
+                  </a:solidFill>
+                </a:uFill>
+                <a:latin typeface="Agency FB" pitchFamily="34" charset="0"/>
               </a:rPr>
               <a:t>sprint</a:t>
             </a:r>
             <a:r>
-              <a:rPr lang="pt-BR" sz="1600" b="0" strike="noStrike" spc="-1" dirty="0">
-                <a:solidFill>
-                  <a:schemeClr val="bg1"/>
-                </a:solidFill>
-                <a:uFill>
-                  <a:solidFill>
-                    <a:srgbClr val="FFFFFF"/>
-                  </a:solidFill>
-                </a:uFill>
-                <a:latin typeface="+mj-lt"/>
+              <a:rPr lang="pt-BR" sz="2000" b="0" strike="noStrike" spc="-1" dirty="0">
+                <a:solidFill>
+                  <a:schemeClr val="bg1"/>
+                </a:solidFill>
+                <a:uFill>
+                  <a:solidFill>
+                    <a:srgbClr val="FFFFFF"/>
+                  </a:solidFill>
+                </a:uFill>
+                <a:latin typeface="Agency FB" pitchFamily="34" charset="0"/>
               </a:rPr>
               <a:t> o software fica mais completo e proporciona ao cliente um melhor acompanhamento.</a:t>
             </a:r>
@@ -4742,72 +4990,72 @@
               <a:buChar char=""/>
             </a:pPr>
             <a:r>
-              <a:rPr lang="pt-BR" sz="1600" b="0" strike="noStrike" spc="-1" dirty="0">
-                <a:solidFill>
-                  <a:schemeClr val="bg1"/>
-                </a:solidFill>
-                <a:uFill>
-                  <a:solidFill>
-                    <a:srgbClr val="FFFFFF"/>
-                  </a:solidFill>
-                </a:uFill>
-                <a:latin typeface="+mj-lt"/>
+              <a:rPr lang="pt-BR" sz="2000" b="0" strike="noStrike" spc="-1" dirty="0">
+                <a:solidFill>
+                  <a:schemeClr val="bg1"/>
+                </a:solidFill>
+                <a:uFill>
+                  <a:solidFill>
+                    <a:srgbClr val="FFFFFF"/>
+                  </a:solidFill>
+                </a:uFill>
+                <a:latin typeface="Agency FB" pitchFamily="34" charset="0"/>
               </a:rPr>
               <a:t>Reuniões agendadas e formulários de </a:t>
             </a:r>
             <a:r>
-              <a:rPr lang="pt-BR" sz="1600" b="0" strike="noStrike" spc="-1" dirty="0" err="1">
-                <a:solidFill>
-                  <a:schemeClr val="bg1"/>
-                </a:solidFill>
-                <a:uFill>
-                  <a:solidFill>
-                    <a:srgbClr val="FFFFFF"/>
-                  </a:solidFill>
-                </a:uFill>
-                <a:latin typeface="+mj-lt"/>
+              <a:rPr lang="pt-BR" sz="2000" b="0" strike="noStrike" spc="-1" dirty="0" err="1">
+                <a:solidFill>
+                  <a:schemeClr val="bg1"/>
+                </a:solidFill>
+                <a:uFill>
+                  <a:solidFill>
+                    <a:srgbClr val="FFFFFF"/>
+                  </a:solidFill>
+                </a:uFill>
+                <a:latin typeface="Agency FB" pitchFamily="34" charset="0"/>
               </a:rPr>
               <a:t>autoavaliação</a:t>
             </a:r>
             <a:r>
-              <a:rPr lang="pt-BR" sz="1600" b="0" strike="noStrike" spc="-1" dirty="0">
-                <a:solidFill>
-                  <a:schemeClr val="bg1"/>
-                </a:solidFill>
-                <a:uFill>
-                  <a:solidFill>
-                    <a:srgbClr val="FFFFFF"/>
-                  </a:solidFill>
-                </a:uFill>
-                <a:latin typeface="+mj-lt"/>
+              <a:rPr lang="pt-BR" sz="2000" b="0" strike="noStrike" spc="-1" dirty="0">
+                <a:solidFill>
+                  <a:schemeClr val="bg1"/>
+                </a:solidFill>
+                <a:uFill>
+                  <a:solidFill>
+                    <a:srgbClr val="FFFFFF"/>
+                  </a:solidFill>
+                </a:uFill>
+                <a:latin typeface="Agency FB" pitchFamily="34" charset="0"/>
               </a:rPr>
               <a:t> ajudam os integrantes a gerenciarem melhor o tempo e desempenho nas </a:t>
             </a:r>
             <a:r>
-              <a:rPr lang="pt-BR" sz="1600" b="0" strike="noStrike" spc="-1" dirty="0" err="1">
-                <a:solidFill>
-                  <a:schemeClr val="bg1"/>
-                </a:solidFill>
-                <a:uFill>
-                  <a:solidFill>
-                    <a:srgbClr val="FFFFFF"/>
-                  </a:solidFill>
-                </a:uFill>
-                <a:latin typeface="+mj-lt"/>
+              <a:rPr lang="pt-BR" sz="2000" b="0" strike="noStrike" spc="-1" dirty="0" err="1">
+                <a:solidFill>
+                  <a:schemeClr val="bg1"/>
+                </a:solidFill>
+                <a:uFill>
+                  <a:solidFill>
+                    <a:srgbClr val="FFFFFF"/>
+                  </a:solidFill>
+                </a:uFill>
+                <a:latin typeface="Agency FB" pitchFamily="34" charset="0"/>
               </a:rPr>
               <a:t>sprints</a:t>
             </a:r>
             <a:r>
-              <a:rPr lang="pt-BR" sz="1600" b="0" strike="noStrike" spc="-1" dirty="0">
-                <a:solidFill>
-                  <a:schemeClr val="bg1"/>
-                </a:solidFill>
-                <a:uFill>
-                  <a:solidFill>
-                    <a:srgbClr val="FFFFFF"/>
-                  </a:solidFill>
-                </a:uFill>
-                <a:latin typeface="+mj-lt"/>
+              <a:rPr lang="pt-BR" sz="2000" b="0" strike="noStrike" spc="-1" dirty="0">
+                <a:solidFill>
+                  <a:schemeClr val="bg1"/>
+                </a:solidFill>
+                <a:uFill>
+                  <a:solidFill>
+                    <a:srgbClr val="FFFFFF"/>
+                  </a:solidFill>
+                </a:uFill>
+                <a:latin typeface="Agency FB" pitchFamily="34" charset="0"/>
               </a:rPr>
               <a:t>.</a:t>
             </a:r>
@@ -4825,16 +5073,16 @@
               <a:buChar char=""/>
             </a:pPr>
             <a:r>
-              <a:rPr lang="pt-BR" sz="1600" b="0" strike="noStrike" spc="-1" dirty="0">
-                <a:solidFill>
-                  <a:schemeClr val="bg1"/>
-                </a:solidFill>
-                <a:uFill>
-                  <a:solidFill>
-                    <a:srgbClr val="FFFFFF"/>
-                  </a:solidFill>
-                </a:uFill>
-                <a:latin typeface="+mj-lt"/>
+              <a:rPr lang="pt-BR" sz="2000" b="0" strike="noStrike" spc="-1" dirty="0">
+                <a:solidFill>
+                  <a:schemeClr val="bg1"/>
+                </a:solidFill>
+                <a:uFill>
+                  <a:solidFill>
+                    <a:srgbClr val="FFFFFF"/>
+                  </a:solidFill>
+                </a:uFill>
+                <a:latin typeface="Agency FB" pitchFamily="34" charset="0"/>
               </a:rPr>
               <a:t>Sinceridade e uma avaliação honesta das habilidades de cada integrante do grupo ajudam em uma divisão de trabalho melhor, onde outro integrante pode assumir responsabilidades de um indivíduo que não possui tanta experiência quanto os outros.</a:t>
             </a:r>
@@ -4852,72 +5100,72 @@
               <a:buChar char=""/>
             </a:pPr>
             <a:r>
-              <a:rPr lang="pt-BR" sz="1600" b="0" strike="noStrike" spc="-1" dirty="0">
-                <a:solidFill>
-                  <a:schemeClr val="bg1"/>
-                </a:solidFill>
-                <a:uFill>
-                  <a:solidFill>
-                    <a:srgbClr val="FFFFFF"/>
-                  </a:solidFill>
-                </a:uFill>
-                <a:latin typeface="+mj-lt"/>
+              <a:rPr lang="pt-BR" sz="2000" b="0" strike="noStrike" spc="-1" dirty="0">
+                <a:solidFill>
+                  <a:schemeClr val="bg1"/>
+                </a:solidFill>
+                <a:uFill>
+                  <a:solidFill>
+                    <a:srgbClr val="FFFFFF"/>
+                  </a:solidFill>
+                </a:uFill>
+                <a:latin typeface="Agency FB" pitchFamily="34" charset="0"/>
               </a:rPr>
               <a:t>O uso de um </a:t>
             </a:r>
             <a:r>
-              <a:rPr lang="pt-BR" sz="1600" b="0" strike="noStrike" spc="-1" dirty="0" err="1">
-                <a:solidFill>
-                  <a:schemeClr val="bg1"/>
-                </a:solidFill>
-                <a:uFill>
-                  <a:solidFill>
-                    <a:srgbClr val="FFFFFF"/>
-                  </a:solidFill>
-                </a:uFill>
-                <a:latin typeface="+mj-lt"/>
+              <a:rPr lang="pt-BR" sz="2000" b="0" strike="noStrike" spc="-1" dirty="0" err="1">
+                <a:solidFill>
+                  <a:schemeClr val="bg1"/>
+                </a:solidFill>
+                <a:uFill>
+                  <a:solidFill>
+                    <a:srgbClr val="FFFFFF"/>
+                  </a:solidFill>
+                </a:uFill>
+                <a:latin typeface="Agency FB" pitchFamily="34" charset="0"/>
               </a:rPr>
               <a:t>planner</a:t>
             </a:r>
             <a:r>
-              <a:rPr lang="pt-BR" sz="1600" b="0" strike="noStrike" spc="-1" dirty="0">
-                <a:solidFill>
-                  <a:schemeClr val="bg1"/>
-                </a:solidFill>
-                <a:uFill>
-                  <a:solidFill>
-                    <a:srgbClr val="FFFFFF"/>
-                  </a:solidFill>
-                </a:uFill>
-                <a:latin typeface="+mj-lt"/>
+              <a:rPr lang="pt-BR" sz="2000" b="0" strike="noStrike" spc="-1" dirty="0">
+                <a:solidFill>
+                  <a:schemeClr val="bg1"/>
+                </a:solidFill>
+                <a:uFill>
+                  <a:solidFill>
+                    <a:srgbClr val="FFFFFF"/>
+                  </a:solidFill>
+                </a:uFill>
+                <a:latin typeface="Agency FB" pitchFamily="34" charset="0"/>
               </a:rPr>
               <a:t> de </a:t>
             </a:r>
             <a:r>
-              <a:rPr lang="pt-BR" sz="1600" b="0" strike="noStrike" spc="-1" dirty="0" err="1">
-                <a:solidFill>
-                  <a:schemeClr val="bg1"/>
-                </a:solidFill>
-                <a:uFill>
-                  <a:solidFill>
-                    <a:srgbClr val="FFFFFF"/>
-                  </a:solidFill>
-                </a:uFill>
-                <a:latin typeface="+mj-lt"/>
+              <a:rPr lang="pt-BR" sz="2000" b="0" strike="noStrike" spc="-1" dirty="0" err="1">
+                <a:solidFill>
+                  <a:schemeClr val="bg1"/>
+                </a:solidFill>
+                <a:uFill>
+                  <a:solidFill>
+                    <a:srgbClr val="FFFFFF"/>
+                  </a:solidFill>
+                </a:uFill>
+                <a:latin typeface="Agency FB" pitchFamily="34" charset="0"/>
               </a:rPr>
               <a:t>sprints</a:t>
             </a:r>
             <a:r>
-              <a:rPr lang="pt-BR" sz="1600" b="0" strike="noStrike" spc="-1" dirty="0">
-                <a:solidFill>
-                  <a:schemeClr val="bg1"/>
-                </a:solidFill>
-                <a:uFill>
-                  <a:solidFill>
-                    <a:srgbClr val="FFFFFF"/>
-                  </a:solidFill>
-                </a:uFill>
-                <a:latin typeface="+mj-lt"/>
+              <a:rPr lang="pt-BR" sz="2000" b="0" strike="noStrike" spc="-1" dirty="0">
+                <a:solidFill>
+                  <a:schemeClr val="bg1"/>
+                </a:solidFill>
+                <a:uFill>
+                  <a:solidFill>
+                    <a:srgbClr val="FFFFFF"/>
+                  </a:solidFill>
+                </a:uFill>
+                <a:latin typeface="Agency FB" pitchFamily="34" charset="0"/>
               </a:rPr>
               <a:t> é essencial para a coesão do grupo e facilitar a autonomia de cada indivíduo.</a:t>
             </a:r>
@@ -4935,44 +5183,44 @@
               <a:buChar char=""/>
             </a:pPr>
             <a:r>
-              <a:rPr lang="pt-BR" sz="1600" b="0" strike="noStrike" spc="-1" dirty="0">
-                <a:solidFill>
-                  <a:schemeClr val="bg1"/>
-                </a:solidFill>
-                <a:uFill>
-                  <a:solidFill>
-                    <a:srgbClr val="FFFFFF"/>
-                  </a:solidFill>
-                </a:uFill>
-                <a:latin typeface="+mj-lt"/>
+              <a:rPr lang="pt-BR" sz="2000" b="0" strike="noStrike" spc="-1" dirty="0">
+                <a:solidFill>
+                  <a:schemeClr val="bg1"/>
+                </a:solidFill>
+                <a:uFill>
+                  <a:solidFill>
+                    <a:srgbClr val="FFFFFF"/>
+                  </a:solidFill>
+                </a:uFill>
+                <a:latin typeface="Agency FB" pitchFamily="34" charset="0"/>
               </a:rPr>
               <a:t>O planejamento das </a:t>
             </a:r>
             <a:r>
-              <a:rPr lang="pt-BR" sz="1600" b="0" strike="noStrike" spc="-1" dirty="0" err="1">
-                <a:solidFill>
-                  <a:schemeClr val="bg1"/>
-                </a:solidFill>
-                <a:uFill>
-                  <a:solidFill>
-                    <a:srgbClr val="FFFFFF"/>
-                  </a:solidFill>
-                </a:uFill>
-                <a:latin typeface="+mj-lt"/>
+              <a:rPr lang="pt-BR" sz="2000" b="0" strike="noStrike" spc="-1" dirty="0" err="1">
+                <a:solidFill>
+                  <a:schemeClr val="bg1"/>
+                </a:solidFill>
+                <a:uFill>
+                  <a:solidFill>
+                    <a:srgbClr val="FFFFFF"/>
+                  </a:solidFill>
+                </a:uFill>
+                <a:latin typeface="Agency FB" pitchFamily="34" charset="0"/>
               </a:rPr>
               <a:t>sprints</a:t>
             </a:r>
             <a:r>
-              <a:rPr lang="pt-BR" sz="1600" b="0" strike="noStrike" spc="-1" dirty="0">
-                <a:solidFill>
-                  <a:schemeClr val="bg1"/>
-                </a:solidFill>
-                <a:uFill>
-                  <a:solidFill>
-                    <a:srgbClr val="FFFFFF"/>
-                  </a:solidFill>
-                </a:uFill>
-                <a:latin typeface="+mj-lt"/>
+              <a:rPr lang="pt-BR" sz="2000" b="0" strike="noStrike" spc="-1" dirty="0">
+                <a:solidFill>
+                  <a:schemeClr val="bg1"/>
+                </a:solidFill>
+                <a:uFill>
+                  <a:solidFill>
+                    <a:srgbClr val="FFFFFF"/>
+                  </a:solidFill>
+                </a:uFill>
+                <a:latin typeface="Agency FB" pitchFamily="34" charset="0"/>
               </a:rPr>
               <a:t> possibilitou uma visão melhor do projeto em seu todo assim como permitiu melhor percepção do tempo necessário para produzir as funcionalidades necessárias.</a:t>
             </a:r>
@@ -4984,13 +5232,13 @@
   <p:clrMapOvr>
     <a:masterClrMapping/>
   </p:clrMapOvr>
-  <mc:AlternateContent xmlns:mc="http://schemas.openxmlformats.org/markup-compatibility/2006">
-    <mc:Choice xmlns:p14="http://schemas.microsoft.com/office/powerpoint/2010/main" Requires="p14">
+  <mc:AlternateContent xmlns:mc="http://schemas.openxmlformats.org/markup-compatibility/2006" xmlns:p14="http://schemas.microsoft.com/office/powerpoint/2010/main">
+    <mc:Choice Requires="p14">
       <p:transition spd="med" p14:dur="700">
         <p:fade/>
       </p:transition>
     </mc:Choice>
-    <mc:Fallback>
+    <mc:Fallback xmlns="">
       <p:transition spd="med">
         <p:fade/>
       </p:transition>
@@ -5152,13 +5400,13 @@
   <p:clrMapOvr>
     <a:masterClrMapping/>
   </p:clrMapOvr>
-  <mc:AlternateContent xmlns:mc="http://schemas.openxmlformats.org/markup-compatibility/2006">
-    <mc:Choice xmlns:p14="http://schemas.microsoft.com/office/powerpoint/2010/main" Requires="p14">
+  <mc:AlternateContent xmlns:mc="http://schemas.openxmlformats.org/markup-compatibility/2006" xmlns:p14="http://schemas.microsoft.com/office/powerpoint/2010/main">
+    <mc:Choice Requires="p14">
       <p:transition spd="med" p14:dur="700">
         <p:fade/>
       </p:transition>
     </mc:Choice>
-    <mc:Fallback>
+    <mc:Fallback xmlns="">
       <p:transition spd="med">
         <p:fade/>
       </p:transition>
@@ -5995,13 +6243,13 @@
   <p:clrMapOvr>
     <a:masterClrMapping/>
   </p:clrMapOvr>
-  <mc:AlternateContent xmlns:mc="http://schemas.openxmlformats.org/markup-compatibility/2006">
-    <mc:Choice xmlns:p14="http://schemas.microsoft.com/office/powerpoint/2010/main" Requires="p14">
+  <mc:AlternateContent xmlns:mc="http://schemas.openxmlformats.org/markup-compatibility/2006" xmlns:p14="http://schemas.microsoft.com/office/powerpoint/2010/main">
+    <mc:Choice Requires="p14">
       <p:transition spd="med" p14:dur="700">
         <p:fade/>
       </p:transition>
     </mc:Choice>
-    <mc:Fallback>
+    <mc:Fallback xmlns="">
       <p:transition spd="med">
         <p:fade/>
       </p:transition>
@@ -6705,13 +6953,13 @@
   <p:clrMapOvr>
     <a:masterClrMapping/>
   </p:clrMapOvr>
-  <mc:AlternateContent xmlns:mc="http://schemas.openxmlformats.org/markup-compatibility/2006">
-    <mc:Choice xmlns:p14="http://schemas.microsoft.com/office/powerpoint/2010/main" Requires="p14">
+  <mc:AlternateContent xmlns:mc="http://schemas.openxmlformats.org/markup-compatibility/2006" xmlns:p14="http://schemas.microsoft.com/office/powerpoint/2010/main">
+    <mc:Choice Requires="p14">
       <p:transition spd="med" p14:dur="700">
         <p:fade/>
       </p:transition>
     </mc:Choice>
-    <mc:Fallback>
+    <mc:Fallback xmlns="">
       <p:transition spd="med">
         <p:fade/>
       </p:transition>
@@ -6818,13 +7066,13 @@
   <p:clrMapOvr>
     <a:masterClrMapping/>
   </p:clrMapOvr>
-  <mc:AlternateContent xmlns:mc="http://schemas.openxmlformats.org/markup-compatibility/2006">
-    <mc:Choice xmlns:p14="http://schemas.microsoft.com/office/powerpoint/2010/main" Requires="p14">
+  <mc:AlternateContent xmlns:mc="http://schemas.openxmlformats.org/markup-compatibility/2006" xmlns:p14="http://schemas.microsoft.com/office/powerpoint/2010/main">
+    <mc:Choice Requires="p14">
       <p:transition spd="med" p14:dur="700">
         <p:fade/>
       </p:transition>
     </mc:Choice>
-    <mc:Fallback>
+    <mc:Fallback xmlns="">
       <p:transition spd="med">
         <p:fade/>
       </p:transition>
@@ -6859,7 +7107,7 @@
       </p:grpSpPr>
       <p:sp>
         <p:nvSpPr>
-          <p:cNvPr id="63" name="TextShape 1"/>
+          <p:cNvPr id="61" name="TextShape 1"/>
           <p:cNvSpPr txBox="1"/>
           <p:nvPr/>
         </p:nvSpPr>
@@ -6895,49 +7143,60 @@
           </a:lstStyle>
           <a:p>
             <a:r>
-              <a:rPr lang="pt-BR" dirty="0"/>
-              <a:t>Vision Box</a:t>
-            </a:r>
+              <a:rPr lang="pt-BR" dirty="0" smtClean="0"/>
+              <a:t>Fluxo PBMN</a:t>
+            </a:r>
+            <a:endParaRPr lang="pt-BR" dirty="0"/>
           </a:p>
         </p:txBody>
       </p:sp>
       <p:pic>
         <p:nvPicPr>
-          <p:cNvPr id="64" name="Imagem 63"/>
-          <p:cNvPicPr/>
+          <p:cNvPr id="2" name="Imagem 1"/>
+          <p:cNvPicPr>
+            <a:picLocks noChangeAspect="1"/>
+          </p:cNvPicPr>
           <p:nvPr/>
         </p:nvPicPr>
         <p:blipFill>
-          <a:blip r:embed="rId2"/>
+          <a:blip r:embed="rId2">
+            <a:extLst>
+              <a:ext uri="{28A0092B-C50C-407E-A947-70E740481C1C}">
+                <a14:useLocalDpi xmlns:a14="http://schemas.microsoft.com/office/drawing/2010/main" val="0"/>
+              </a:ext>
+            </a:extLst>
+          </a:blip>
           <a:stretch>
             <a:fillRect/>
           </a:stretch>
         </p:blipFill>
         <p:spPr>
           <a:xfrm>
-            <a:off x="216000" y="1800000"/>
-            <a:ext cx="9648000" cy="5424120"/>
-          </a:xfrm>
-          <a:prstGeom prst="rect">
-            <a:avLst/>
-          </a:prstGeom>
-          <a:ln>
-            <a:noFill/>
-          </a:ln>
+            <a:off x="77440" y="1906947"/>
+            <a:ext cx="9925744" cy="5336895"/>
+          </a:xfrm>
+          <a:prstGeom prst="rect">
+            <a:avLst/>
+          </a:prstGeom>
         </p:spPr>
       </p:pic>
     </p:spTree>
+    <p:extLst>
+      <p:ext uri="{BB962C8B-B14F-4D97-AF65-F5344CB8AC3E}">
+        <p14:creationId xmlns:p14="http://schemas.microsoft.com/office/powerpoint/2010/main" val="633172740"/>
+      </p:ext>
+    </p:extLst>
   </p:cSld>
   <p:clrMapOvr>
     <a:masterClrMapping/>
   </p:clrMapOvr>
-  <mc:AlternateContent xmlns:mc="http://schemas.openxmlformats.org/markup-compatibility/2006">
-    <mc:Choice xmlns:p14="http://schemas.microsoft.com/office/powerpoint/2010/main" Requires="p14">
+  <mc:AlternateContent xmlns:mc="http://schemas.openxmlformats.org/markup-compatibility/2006" xmlns:p14="http://schemas.microsoft.com/office/powerpoint/2010/main">
+    <mc:Choice Requires="p14">
       <p:transition spd="med" p14:dur="700">
         <p:fade/>
       </p:transition>
     </mc:Choice>
-    <mc:Fallback>
+    <mc:Fallback xmlns="">
       <p:transition spd="med">
         <p:fade/>
       </p:transition>
@@ -6972,7 +7231,7 @@
       </p:grpSpPr>
       <p:sp>
         <p:nvSpPr>
-          <p:cNvPr id="65" name="TextShape 1"/>
+          <p:cNvPr id="63" name="TextShape 1"/>
           <p:cNvSpPr txBox="1"/>
           <p:nvPr/>
         </p:nvSpPr>
@@ -7016,7 +7275,7 @@
       </p:sp>
       <p:pic>
         <p:nvPicPr>
-          <p:cNvPr id="66" name="Imagem 65"/>
+          <p:cNvPr id="64" name="Imagem 63"/>
           <p:cNvPicPr/>
           <p:nvPr/>
         </p:nvPicPr>
@@ -7028,8 +7287,8 @@
         </p:blipFill>
         <p:spPr>
           <a:xfrm>
-            <a:off x="259200" y="1728000"/>
-            <a:ext cx="9604800" cy="5400000"/>
+            <a:off x="216000" y="1800000"/>
+            <a:ext cx="9648000" cy="5424120"/>
           </a:xfrm>
           <a:prstGeom prst="rect">
             <a:avLst/>
@@ -7044,13 +7303,13 @@
   <p:clrMapOvr>
     <a:masterClrMapping/>
   </p:clrMapOvr>
-  <mc:AlternateContent xmlns:mc="http://schemas.openxmlformats.org/markup-compatibility/2006">
-    <mc:Choice xmlns:p14="http://schemas.microsoft.com/office/powerpoint/2010/main" Requires="p14">
+  <mc:AlternateContent xmlns:mc="http://schemas.openxmlformats.org/markup-compatibility/2006" xmlns:p14="http://schemas.microsoft.com/office/powerpoint/2010/main">
+    <mc:Choice Requires="p14">
       <p:transition spd="med" p14:dur="700">
         <p:fade/>
       </p:transition>
     </mc:Choice>
-    <mc:Fallback>
+    <mc:Fallback xmlns="">
       <p:transition spd="med">
         <p:fade/>
       </p:transition>
@@ -7085,7 +7344,7 @@
       </p:grpSpPr>
       <p:sp>
         <p:nvSpPr>
-          <p:cNvPr id="67" name="TextShape 1"/>
+          <p:cNvPr id="65" name="TextShape 1"/>
           <p:cNvSpPr txBox="1"/>
           <p:nvPr/>
         </p:nvSpPr>
@@ -7121,112 +7380,49 @@
           </a:lstStyle>
           <a:p>
             <a:r>
-              <a:rPr lang="pt-BR" dirty="0" err="1"/>
-              <a:t>Elevator</a:t>
-            </a:r>
-            <a:r>
               <a:rPr lang="pt-BR" dirty="0"/>
-              <a:t> </a:t>
-            </a:r>
-            <a:r>
-              <a:rPr lang="pt-BR" dirty="0" err="1"/>
-              <a:t>Statement</a:t>
-            </a:r>
-            <a:endParaRPr lang="pt-BR" dirty="0"/>
-          </a:p>
-        </p:txBody>
-      </p:sp>
-      <p:sp>
-        <p:nvSpPr>
-          <p:cNvPr id="68" name="TextShape 2"/>
-          <p:cNvSpPr txBox="1"/>
+              <a:t>Vision Box</a:t>
+            </a:r>
+          </a:p>
+        </p:txBody>
+      </p:sp>
+      <p:pic>
+        <p:nvPicPr>
+          <p:cNvPr id="66" name="Imagem 65"/>
+          <p:cNvPicPr/>
           <p:nvPr/>
-        </p:nvSpPr>
-        <p:spPr>
-          <a:xfrm>
-            <a:off x="504000" y="1769039"/>
-            <a:ext cx="9071640" cy="5323165"/>
-          </a:xfrm>
-          <a:prstGeom prst="rect">
-            <a:avLst/>
-          </a:prstGeom>
-          <a:noFill/>
+        </p:nvPicPr>
+        <p:blipFill>
+          <a:blip r:embed="rId2"/>
+          <a:stretch>
+            <a:fillRect/>
+          </a:stretch>
+        </p:blipFill>
+        <p:spPr>
+          <a:xfrm>
+            <a:off x="259200" y="1728000"/>
+            <a:ext cx="9604800" cy="5400000"/>
+          </a:xfrm>
+          <a:prstGeom prst="rect">
+            <a:avLst/>
+          </a:prstGeom>
           <a:ln>
             <a:noFill/>
           </a:ln>
         </p:spPr>
-        <p:txBody>
-          <a:bodyPr lIns="0" tIns="0" rIns="0" bIns="0"/>
-          <a:lstStyle/>
-          <a:p>
-            <a:pPr algn="just">
-              <a:lnSpc>
-                <a:spcPct val="114000"/>
-              </a:lnSpc>
-              <a:spcAft>
-                <a:spcPts val="600"/>
-              </a:spcAft>
-            </a:pPr>
-            <a:r>
-              <a:rPr lang="pt-BR" sz="2400" b="0" i="1" strike="noStrike" spc="-1" dirty="0">
-                <a:solidFill>
-                  <a:srgbClr val="FFFFFF"/>
-                </a:solidFill>
-                <a:uFill>
-                  <a:solidFill>
-                    <a:srgbClr val="FFFFFF"/>
-                  </a:solidFill>
-                </a:uFill>
-                <a:latin typeface="Agency FB" pitchFamily="34" charset="0"/>
-                <a:ea typeface="Microsoft YaHei"/>
-              </a:rPr>
-              <a:t>Para &lt;&lt;alunos, monitores e professores universitários&gt;&gt; Que &lt;&lt;necessitam de uma plataforma de integração para as monitorias&gt;&gt; O &lt;&lt;</a:t>
-            </a:r>
-            <a:r>
-              <a:rPr lang="pt-BR" sz="2400" b="0" i="1" strike="noStrike" spc="-1" dirty="0" err="1">
-                <a:solidFill>
-                  <a:srgbClr val="FFFFFF"/>
-                </a:solidFill>
-                <a:uFill>
-                  <a:solidFill>
-                    <a:srgbClr val="FFFFFF"/>
-                  </a:solidFill>
-                </a:uFill>
-                <a:latin typeface="Agency FB" pitchFamily="34" charset="0"/>
-                <a:ea typeface="Microsoft YaHei"/>
-              </a:rPr>
-              <a:t>Academicci</a:t>
-            </a:r>
-            <a:r>
-              <a:rPr lang="pt-BR" sz="2400" b="0" i="1" strike="noStrike" spc="-1" dirty="0">
-                <a:solidFill>
-                  <a:srgbClr val="FFFFFF"/>
-                </a:solidFill>
-                <a:uFill>
-                  <a:solidFill>
-                    <a:srgbClr val="FFFFFF"/>
-                  </a:solidFill>
-                </a:uFill>
-                <a:latin typeface="Agency FB" pitchFamily="34" charset="0"/>
-                <a:ea typeface="Microsoft YaHei"/>
-              </a:rPr>
-              <a:t>&gt;&gt;é um &lt;&lt;aplicação baseada em web&gt;&gt; Que &lt;&lt;integra os aspectos da monitoria em um ambiente virtual, possibilitando comunicação, controle e divulgação de conteúdo criando fácil acesso entre alunos e mentores&gt;&gt; Diferentemente do &lt;&lt; controle de chamadas e conteúdos em planilhas e papéis, comunicação informal e distanciamento do docente&gt;&gt; Nosso produto &lt;&lt;busca facilitar a interação entre monitores, professores e alunos; oferecendo gestão do processo de monitoria, possibilitar o compartilhamento de conhecimento de forma real e efetiva e disponibiliza uma plataforma de estudos sanando os problemas gerados atualmente. Automatização dos processos e emissão dos certificados&gt;&gt;</a:t>
-            </a:r>
-          </a:p>
-        </p:txBody>
-      </p:sp>
+      </p:pic>
     </p:spTree>
   </p:cSld>
   <p:clrMapOvr>
     <a:masterClrMapping/>
   </p:clrMapOvr>
-  <mc:AlternateContent xmlns:mc="http://schemas.openxmlformats.org/markup-compatibility/2006">
-    <mc:Choice xmlns:p14="http://schemas.microsoft.com/office/powerpoint/2010/main" Requires="p14">
+  <mc:AlternateContent xmlns:mc="http://schemas.openxmlformats.org/markup-compatibility/2006" xmlns:p14="http://schemas.microsoft.com/office/powerpoint/2010/main">
+    <mc:Choice Requires="p14">
       <p:transition spd="med" p14:dur="700">
         <p:fade/>
       </p:transition>
     </mc:Choice>
-    <mc:Fallback>
+    <mc:Fallback xmlns="">
       <p:transition spd="med">
         <p:fade/>
       </p:transition>
@@ -7466,7 +7662,7 @@
   <a:extraClrSchemeLst/>
   <a:extLst>
     <a:ext uri="{05A4C25C-085E-4340-85A3-A5531E510DB2}">
-      <thm15:themeFamily xmlns:thm15="http://schemas.microsoft.com/office/thememl/2012/main" xmlns="" name="Office Theme" id="{62F939B6-93AF-4DB8-9C6B-D6C7DFDC589F}" vid="{4A3C46E8-61CC-4603-A589-7422A47A8E4A}"/>
+      <thm15:themeFamily xmlns="" xmlns:thm15="http://schemas.microsoft.com/office/thememl/2012/main" name="Office Theme" id="{62F939B6-93AF-4DB8-9C6B-D6C7DFDC589F}" vid="{4A3C46E8-61CC-4603-A589-7422A47A8E4A}"/>
     </a:ext>
   </a:extLst>
 </a:theme>

</xml_diff>